<commit_message>
[UPDATE] implement some new features like total P-V curve of the system
</commit_message>
<xml_diff>
--- a/ProgettoRESM.pptx
+++ b/ProgettoRESM.pptx
@@ -8,13 +8,13 @@
     <p:sldId id="256" r:id="rId2"/>
     <p:sldId id="265" r:id="rId3"/>
     <p:sldId id="257" r:id="rId4"/>
-    <p:sldId id="260" r:id="rId5"/>
-    <p:sldId id="266" r:id="rId6"/>
-    <p:sldId id="258" r:id="rId7"/>
-    <p:sldId id="268" r:id="rId8"/>
+    <p:sldId id="266" r:id="rId5"/>
+    <p:sldId id="258" r:id="rId6"/>
+    <p:sldId id="268" r:id="rId7"/>
+    <p:sldId id="270" r:id="rId8"/>
     <p:sldId id="269" r:id="rId9"/>
-    <p:sldId id="270" r:id="rId10"/>
-    <p:sldId id="271" r:id="rId11"/>
+    <p:sldId id="271" r:id="rId10"/>
+    <p:sldId id="278" r:id="rId11"/>
     <p:sldId id="272" r:id="rId12"/>
     <p:sldId id="273" r:id="rId13"/>
     <p:sldId id="274" r:id="rId14"/>
@@ -1246,12 +1246,12 @@
         </a:fontRef>
       </dsp:style>
       <dsp:txBody>
-        <a:bodyPr spcFirstLastPara="0" vert="horz" wrap="square" lIns="83820" tIns="83820" rIns="83820" bIns="83820" numCol="1" spcCol="1270" anchor="ctr" anchorCtr="0">
+        <a:bodyPr spcFirstLastPara="0" vert="horz" wrap="square" lIns="80010" tIns="80010" rIns="80010" bIns="80010" numCol="1" spcCol="1270" anchor="ctr" anchorCtr="0">
           <a:noAutofit/>
         </a:bodyPr>
         <a:lstStyle/>
         <a:p>
-          <a:pPr marL="0" lvl="0" indent="0" algn="l" defTabSz="977900">
+          <a:pPr marL="0" lvl="0" indent="0" algn="l" defTabSz="933450">
             <a:lnSpc>
               <a:spcPct val="90000"/>
             </a:lnSpc>
@@ -1264,10 +1264,10 @@
             <a:buNone/>
           </a:pPr>
           <a:r>
-            <a:rPr lang="it-IT" sz="2200" kern="1200"/>
+            <a:rPr lang="it-IT" sz="2100" kern="1200"/>
             <a:t>Mesure the I-V curve for each panel</a:t>
           </a:r>
-          <a:endParaRPr lang="en-US" sz="2200" kern="1200"/>
+          <a:endParaRPr lang="en-US" sz="2100" kern="1200"/>
         </a:p>
       </dsp:txBody>
       <dsp:txXfrm>
@@ -1327,12 +1327,12 @@
         </a:fontRef>
       </dsp:style>
       <dsp:txBody>
-        <a:bodyPr spcFirstLastPara="0" vert="horz" wrap="square" lIns="83820" tIns="83820" rIns="83820" bIns="83820" numCol="1" spcCol="1270" anchor="ctr" anchorCtr="0">
+        <a:bodyPr spcFirstLastPara="0" vert="horz" wrap="square" lIns="80010" tIns="80010" rIns="80010" bIns="80010" numCol="1" spcCol="1270" anchor="ctr" anchorCtr="0">
           <a:noAutofit/>
         </a:bodyPr>
         <a:lstStyle/>
         <a:p>
-          <a:pPr marL="0" lvl="0" indent="0" algn="l" defTabSz="977900">
+          <a:pPr marL="0" lvl="0" indent="0" algn="l" defTabSz="933450">
             <a:lnSpc>
               <a:spcPct val="90000"/>
             </a:lnSpc>
@@ -1345,10 +1345,10 @@
             <a:buNone/>
           </a:pPr>
           <a:r>
-            <a:rPr lang="it-IT" sz="2200" kern="1200"/>
+            <a:rPr lang="it-IT" sz="2100" kern="1200"/>
             <a:t>Make a I-V curve for a string of panel</a:t>
           </a:r>
-          <a:endParaRPr lang="en-US" sz="2200" kern="1200"/>
+          <a:endParaRPr lang="en-US" sz="2100" kern="1200"/>
         </a:p>
       </dsp:txBody>
       <dsp:txXfrm>
@@ -1408,12 +1408,12 @@
         </a:fontRef>
       </dsp:style>
       <dsp:txBody>
-        <a:bodyPr spcFirstLastPara="0" vert="horz" wrap="square" lIns="83820" tIns="83820" rIns="83820" bIns="83820" numCol="1" spcCol="1270" anchor="ctr" anchorCtr="0">
+        <a:bodyPr spcFirstLastPara="0" vert="horz" wrap="square" lIns="80010" tIns="80010" rIns="80010" bIns="80010" numCol="1" spcCol="1270" anchor="ctr" anchorCtr="0">
           <a:noAutofit/>
         </a:bodyPr>
         <a:lstStyle/>
         <a:p>
-          <a:pPr marL="0" lvl="0" indent="0" algn="l" defTabSz="977900">
+          <a:pPr marL="0" lvl="0" indent="0" algn="l" defTabSz="933450">
             <a:lnSpc>
               <a:spcPct val="90000"/>
             </a:lnSpc>
@@ -1426,10 +1426,10 @@
             <a:buNone/>
           </a:pPr>
           <a:r>
-            <a:rPr lang="it-IT" sz="2200" kern="1200"/>
+            <a:rPr lang="it-IT" sz="2100" kern="1200"/>
             <a:t>Make an optimization for the parallel of N strings</a:t>
           </a:r>
-          <a:endParaRPr lang="en-US" sz="2200" kern="1200"/>
+          <a:endParaRPr lang="en-US" sz="2100" kern="1200"/>
         </a:p>
       </dsp:txBody>
       <dsp:txXfrm>
@@ -1489,12 +1489,12 @@
         </a:fontRef>
       </dsp:style>
       <dsp:txBody>
-        <a:bodyPr spcFirstLastPara="0" vert="horz" wrap="square" lIns="83820" tIns="83820" rIns="83820" bIns="83820" numCol="1" spcCol="1270" anchor="ctr" anchorCtr="0">
+        <a:bodyPr spcFirstLastPara="0" vert="horz" wrap="square" lIns="80010" tIns="80010" rIns="80010" bIns="80010" numCol="1" spcCol="1270" anchor="ctr" anchorCtr="0">
           <a:noAutofit/>
         </a:bodyPr>
         <a:lstStyle/>
         <a:p>
-          <a:pPr marL="0" lvl="0" indent="0" algn="l" defTabSz="977900">
+          <a:pPr marL="0" lvl="0" indent="0" algn="l" defTabSz="933450">
             <a:lnSpc>
               <a:spcPct val="90000"/>
             </a:lnSpc>
@@ -1507,10 +1507,10 @@
             <a:buNone/>
           </a:pPr>
           <a:r>
-            <a:rPr lang="it-IT" sz="2200" kern="1200"/>
+            <a:rPr lang="it-IT" sz="2100" kern="1200"/>
             <a:t>Plot the results starting from the single I-V curve to the optimized power result.</a:t>
           </a:r>
-          <a:endParaRPr lang="en-US" sz="2200" kern="1200"/>
+          <a:endParaRPr lang="en-US" sz="2100" kern="1200"/>
         </a:p>
       </dsp:txBody>
       <dsp:txXfrm>
@@ -1573,12 +1573,12 @@
         <a:fontRef idx="minor"/>
       </dsp:style>
       <dsp:txBody>
-        <a:bodyPr spcFirstLastPara="0" vert="horz" wrap="square" lIns="31750" tIns="31750" rIns="31750" bIns="31750" numCol="1" spcCol="1270" anchor="ctr" anchorCtr="0">
+        <a:bodyPr spcFirstLastPara="0" vert="horz" wrap="square" lIns="30480" tIns="30480" rIns="30480" bIns="30480" numCol="1" spcCol="1270" anchor="ctr" anchorCtr="0">
           <a:noAutofit/>
         </a:bodyPr>
         <a:lstStyle/>
         <a:p>
-          <a:pPr marL="0" lvl="0" indent="0" algn="ctr" defTabSz="1111250">
+          <a:pPr marL="0" lvl="0" indent="0" algn="ctr" defTabSz="1066800">
             <a:lnSpc>
               <a:spcPct val="90000"/>
             </a:lnSpc>
@@ -1590,7 +1590,7 @@
             </a:spcAft>
             <a:buNone/>
           </a:pPr>
-          <a:endParaRPr lang="en-US" sz="2500" kern="1200"/>
+          <a:endParaRPr lang="en-US" sz="2400" kern="1200"/>
         </a:p>
       </dsp:txBody>
       <dsp:txXfrm>
@@ -1653,12 +1653,12 @@
         <a:fontRef idx="minor"/>
       </dsp:style>
       <dsp:txBody>
-        <a:bodyPr spcFirstLastPara="0" vert="horz" wrap="square" lIns="31750" tIns="31750" rIns="31750" bIns="31750" numCol="1" spcCol="1270" anchor="ctr" anchorCtr="0">
+        <a:bodyPr spcFirstLastPara="0" vert="horz" wrap="square" lIns="30480" tIns="30480" rIns="30480" bIns="30480" numCol="1" spcCol="1270" anchor="ctr" anchorCtr="0">
           <a:noAutofit/>
         </a:bodyPr>
         <a:lstStyle/>
         <a:p>
-          <a:pPr marL="0" lvl="0" indent="0" algn="ctr" defTabSz="1111250">
+          <a:pPr marL="0" lvl="0" indent="0" algn="ctr" defTabSz="1066800">
             <a:lnSpc>
               <a:spcPct val="90000"/>
             </a:lnSpc>
@@ -1670,7 +1670,7 @@
             </a:spcAft>
             <a:buNone/>
           </a:pPr>
-          <a:endParaRPr lang="en-US" sz="2500" kern="1200"/>
+          <a:endParaRPr lang="en-US" sz="2400" kern="1200"/>
         </a:p>
       </dsp:txBody>
       <dsp:txXfrm>
@@ -1733,12 +1733,12 @@
         <a:fontRef idx="minor"/>
       </dsp:style>
       <dsp:txBody>
-        <a:bodyPr spcFirstLastPara="0" vert="horz" wrap="square" lIns="31750" tIns="31750" rIns="31750" bIns="31750" numCol="1" spcCol="1270" anchor="ctr" anchorCtr="0">
+        <a:bodyPr spcFirstLastPara="0" vert="horz" wrap="square" lIns="30480" tIns="30480" rIns="30480" bIns="30480" numCol="1" spcCol="1270" anchor="ctr" anchorCtr="0">
           <a:noAutofit/>
         </a:bodyPr>
         <a:lstStyle/>
         <a:p>
-          <a:pPr marL="0" lvl="0" indent="0" algn="ctr" defTabSz="1111250">
+          <a:pPr marL="0" lvl="0" indent="0" algn="ctr" defTabSz="1066800">
             <a:lnSpc>
               <a:spcPct val="90000"/>
             </a:lnSpc>
@@ -1750,7 +1750,7 @@
             </a:spcAft>
             <a:buNone/>
           </a:pPr>
-          <a:endParaRPr lang="en-US" sz="2500" kern="1200"/>
+          <a:endParaRPr lang="en-US" sz="2400" kern="1200"/>
         </a:p>
       </dsp:txBody>
       <dsp:txXfrm>
@@ -4176,7 +4176,7 @@
           <a:p>
             <a:fld id="{02AC24A9-CCB6-4F8D-B8DB-C2F3692CFA5A}" type="datetimeFigureOut">
               <a:rPr lang="en-US" smtClean="0"/>
-              <a:t>5/21/2023</a:t>
+              <a:t>5/22/2023</a:t>
             </a:fld>
             <a:endParaRPr lang="en-US" dirty="0"/>
           </a:p>
@@ -4546,7 +4546,7 @@
           <a:p>
             <a:fld id="{02AC24A9-CCB6-4F8D-B8DB-C2F3692CFA5A}" type="datetimeFigureOut">
               <a:rPr lang="en-US" smtClean="0"/>
-              <a:t>5/21/2023</a:t>
+              <a:t>5/22/2023</a:t>
             </a:fld>
             <a:endParaRPr lang="en-US"/>
           </a:p>
@@ -4755,7 +4755,7 @@
           <a:p>
             <a:fld id="{02AC24A9-CCB6-4F8D-B8DB-C2F3692CFA5A}" type="datetimeFigureOut">
               <a:rPr lang="en-US" smtClean="0"/>
-              <a:t>5/21/2023</a:t>
+              <a:t>5/22/2023</a:t>
             </a:fld>
             <a:endParaRPr lang="en-US"/>
           </a:p>
@@ -5225,7 +5225,7 @@
           <a:p>
             <a:fld id="{02AC24A9-CCB6-4F8D-B8DB-C2F3692CFA5A}" type="datetimeFigureOut">
               <a:rPr lang="en-US" smtClean="0"/>
-              <a:t>5/21/2023</a:t>
+              <a:t>5/22/2023</a:t>
             </a:fld>
             <a:endParaRPr lang="en-US"/>
           </a:p>
@@ -5679,7 +5679,7 @@
           <a:p>
             <a:fld id="{02AC24A9-CCB6-4F8D-B8DB-C2F3692CFA5A}" type="datetimeFigureOut">
               <a:rPr lang="en-US" smtClean="0"/>
-              <a:t>5/21/2023</a:t>
+              <a:t>5/22/2023</a:t>
             </a:fld>
             <a:endParaRPr lang="en-US"/>
           </a:p>
@@ -6211,7 +6211,7 @@
           <a:p>
             <a:fld id="{02AC24A9-CCB6-4F8D-B8DB-C2F3692CFA5A}" type="datetimeFigureOut">
               <a:rPr lang="en-US" smtClean="0"/>
-              <a:t>5/21/2023</a:t>
+              <a:t>5/22/2023</a:t>
             </a:fld>
             <a:endParaRPr lang="en-US"/>
           </a:p>
@@ -6910,7 +6910,7 @@
           <a:p>
             <a:fld id="{02AC24A9-CCB6-4F8D-B8DB-C2F3692CFA5A}" type="datetimeFigureOut">
               <a:rPr lang="en-US" smtClean="0"/>
-              <a:t>5/21/2023</a:t>
+              <a:t>5/22/2023</a:t>
             </a:fld>
             <a:endParaRPr lang="en-US"/>
           </a:p>
@@ -7239,7 +7239,7 @@
           <a:p>
             <a:fld id="{02AC24A9-CCB6-4F8D-B8DB-C2F3692CFA5A}" type="datetimeFigureOut">
               <a:rPr lang="en-US" smtClean="0"/>
-              <a:t>5/21/2023</a:t>
+              <a:t>5/22/2023</a:t>
             </a:fld>
             <a:endParaRPr lang="en-US"/>
           </a:p>
@@ -7352,7 +7352,7 @@
           <a:p>
             <a:fld id="{02AC24A9-CCB6-4F8D-B8DB-C2F3692CFA5A}" type="datetimeFigureOut">
               <a:rPr lang="en-US" smtClean="0"/>
-              <a:t>5/21/2023</a:t>
+              <a:t>5/22/2023</a:t>
             </a:fld>
             <a:endParaRPr lang="en-US"/>
           </a:p>
@@ -7847,7 +7847,7 @@
           <a:p>
             <a:fld id="{02AC24A9-CCB6-4F8D-B8DB-C2F3692CFA5A}" type="datetimeFigureOut">
               <a:rPr lang="en-US" smtClean="0"/>
-              <a:t>5/21/2023</a:t>
+              <a:t>5/22/2023</a:t>
             </a:fld>
             <a:endParaRPr lang="en-US" dirty="0"/>
           </a:p>
@@ -8324,7 +8324,7 @@
           <a:p>
             <a:fld id="{02AC24A9-CCB6-4F8D-B8DB-C2F3692CFA5A}" type="datetimeFigureOut">
               <a:rPr lang="en-US" smtClean="0"/>
-              <a:t>5/21/2023</a:t>
+              <a:t>5/22/2023</a:t>
             </a:fld>
             <a:endParaRPr lang="en-US"/>
           </a:p>
@@ -8563,7 +8563,7 @@
           <a:p>
             <a:fld id="{02AC24A9-CCB6-4F8D-B8DB-C2F3692CFA5A}" type="datetimeFigureOut">
               <a:rPr lang="en-US" smtClean="0"/>
-              <a:t>5/21/2023</a:t>
+              <a:t>5/22/2023</a:t>
             </a:fld>
             <a:endParaRPr lang="en-US"/>
           </a:p>
@@ -9490,13 +9490,13 @@
   <p:clrMapOvr>
     <a:masterClrMapping/>
   </p:clrMapOvr>
-  <mc:AlternateContent xmlns:mc="http://schemas.openxmlformats.org/markup-compatibility/2006">
-    <mc:Choice xmlns:p159="http://schemas.microsoft.com/office/powerpoint/2015/09/main" Requires="p159">
+  <mc:AlternateContent xmlns:mc="http://schemas.openxmlformats.org/markup-compatibility/2006" xmlns:p159="http://schemas.microsoft.com/office/powerpoint/2015/09/main">
+    <mc:Choice Requires="p159">
       <p:transition xmlns:p14="http://schemas.microsoft.com/office/powerpoint/2010/main" spd="slow" p14:dur="2000">
         <p159:morph option="byObject"/>
       </p:transition>
     </mc:Choice>
-    <mc:Fallback>
+    <mc:Fallback xmlns="">
       <p:transition spd="slow">
         <p:fade/>
       </p:transition>
@@ -9508,6 +9508,14 @@
 <file path=ppt/slides/slide10.xml><?xml version="1.0" encoding="utf-8"?>
 <p:sld xmlns:a="http://schemas.openxmlformats.org/drawingml/2006/main" xmlns:r="http://schemas.openxmlformats.org/officeDocument/2006/relationships" xmlns:p="http://schemas.openxmlformats.org/presentationml/2006/main">
   <p:cSld>
+    <p:bg>
+      <p:bgPr>
+        <a:solidFill>
+          <a:schemeClr val="bg1"/>
+        </a:solidFill>
+        <a:effectLst/>
+      </p:bgPr>
+    </p:bg>
     <p:spTree>
       <p:nvGrpSpPr>
         <p:cNvPr id="1" name=""/>
@@ -9522,54 +9530,40 @@
           <a:chExt cx="0" cy="0"/>
         </a:xfrm>
       </p:grpSpPr>
-      <p:sp>
-        <p:nvSpPr>
-          <p:cNvPr id="2" name="Titolo 1">
-            <a:extLst>
-              <a:ext uri="{FF2B5EF4-FFF2-40B4-BE49-F238E27FC236}">
-                <a16:creationId xmlns:a16="http://schemas.microsoft.com/office/drawing/2014/main" id="{FA74FA27-809E-FA42-4923-899507F85FF8}"/>
+      <p:sp useBgFill="1">
+        <p:nvSpPr>
+          <p:cNvPr id="19" name="Rectangle 18">
+            <a:extLst>
+              <a:ext uri="{FF2B5EF4-FFF2-40B4-BE49-F238E27FC236}">
+                <a16:creationId xmlns:a16="http://schemas.microsoft.com/office/drawing/2014/main" id="{21516CB1-E8C8-4751-B6A6-46B2D1E72A61}"/>
+              </a:ext>
+              <a:ext uri="{C183D7F6-B498-43B3-948B-1728B52AA6E4}">
+                <adec:decorative xmlns:adec="http://schemas.microsoft.com/office/drawing/2017/decorative" val="1"/>
               </a:ext>
             </a:extLst>
           </p:cNvPr>
           <p:cNvSpPr>
-            <a:spLocks noGrp="1"/>
+            <a:spLocks noGrp="1" noRot="1" noChangeAspect="1" noMove="1" noResize="1" noEditPoints="1" noAdjustHandles="1" noChangeArrowheads="1" noChangeShapeType="1" noTextEdit="1"/>
           </p:cNvSpPr>
           <p:nvPr>
-            <p:ph type="title"/>
+            <p:extLst>
+              <p:ext uri="{386F3935-93C4-4BCD-93E2-E3B085C9AB24}">
+                <p16:designElem xmlns:p16="http://schemas.microsoft.com/office/powerpoint/2015/main" val="1"/>
+              </p:ext>
+            </p:extLst>
           </p:nvPr>
-        </p:nvSpPr>
-        <p:spPr/>
-        <p:txBody>
-          <a:bodyPr/>
-          <a:lstStyle/>
-          <a:p>
-            <a:r>
-              <a:rPr lang="it-IT" dirty="0"/>
-              <a:t>PVsimulator class </a:t>
-            </a:r>
-          </a:p>
-        </p:txBody>
-      </p:sp>
-      <p:sp>
-        <p:nvSpPr>
-          <p:cNvPr id="3" name="Rectangle: Rounded Corners 2">
-            <a:extLst>
-              <a:ext uri="{FF2B5EF4-FFF2-40B4-BE49-F238E27FC236}">
-                <a16:creationId xmlns:a16="http://schemas.microsoft.com/office/drawing/2014/main" id="{54D67E87-275C-12E7-B95E-F8958F9EE690}"/>
-              </a:ext>
-            </a:extLst>
-          </p:cNvPr>
-          <p:cNvSpPr/>
-          <p:nvPr/>
         </p:nvSpPr>
         <p:spPr>
           <a:xfrm>
-            <a:off x="590204" y="2635135"/>
-            <a:ext cx="4746567" cy="3607723"/>
+            <a:off x="0" y="0"/>
+            <a:ext cx="12192000" cy="6858000"/>
           </a:xfrm>
-          <a:prstGeom prst="roundRect">
+          <a:prstGeom prst="rect">
             <a:avLst/>
           </a:prstGeom>
+          <a:ln>
+            <a:noFill/>
+          </a:ln>
         </p:spPr>
         <p:style>
           <a:lnRef idx="2">
@@ -9592,30 +9586,82 @@
           <a:lstStyle/>
           <a:p>
             <a:pPr algn="ctr"/>
-            <a:endParaRPr lang="it-IT" dirty="0"/>
-          </a:p>
-        </p:txBody>
-      </p:sp>
-      <p:sp>
-        <p:nvSpPr>
-          <p:cNvPr id="4" name="Rectangle: Rounded Corners 3">
-            <a:extLst>
-              <a:ext uri="{FF2B5EF4-FFF2-40B4-BE49-F238E27FC236}">
-                <a16:creationId xmlns:a16="http://schemas.microsoft.com/office/drawing/2014/main" id="{199BE6D5-8E78-4DD9-CC2D-391E5BDEF584}"/>
-              </a:ext>
-            </a:extLst>
-          </p:cNvPr>
-          <p:cNvSpPr/>
-          <p:nvPr/>
+            <a:endParaRPr lang="en-US"/>
+          </a:p>
+        </p:txBody>
+      </p:sp>
+      <p:sp>
+        <p:nvSpPr>
+          <p:cNvPr id="2" name="Titolo 1">
+            <a:extLst>
+              <a:ext uri="{FF2B5EF4-FFF2-40B4-BE49-F238E27FC236}">
+                <a16:creationId xmlns:a16="http://schemas.microsoft.com/office/drawing/2014/main" id="{FA74FA27-809E-FA42-4923-899507F85FF8}"/>
+              </a:ext>
+            </a:extLst>
+          </p:cNvPr>
+          <p:cNvSpPr>
+            <a:spLocks noGrp="1"/>
+          </p:cNvSpPr>
+          <p:nvPr>
+            <p:ph type="title"/>
+          </p:nvPr>
         </p:nvSpPr>
         <p:spPr>
           <a:xfrm>
-            <a:off x="6855231" y="2635134"/>
-            <a:ext cx="4746567" cy="3607723"/>
+            <a:off x="429768" y="411480"/>
+            <a:ext cx="11131298" cy="1106424"/>
           </a:xfrm>
-          <a:prstGeom prst="roundRect">
+        </p:spPr>
+        <p:txBody>
+          <a:bodyPr vert="horz" lIns="91440" tIns="45720" rIns="91440" bIns="45720" rtlCol="0" anchor="ctr">
+            <a:normAutofit/>
+          </a:bodyPr>
+          <a:lstStyle/>
+          <a:p>
+            <a:r>
+              <a:rPr lang="en-US" sz="3600"/>
+              <a:t>Shadow zone creator</a:t>
+            </a:r>
+          </a:p>
+        </p:txBody>
+      </p:sp>
+      <p:sp>
+        <p:nvSpPr>
+          <p:cNvPr id="21" name="Rectangle 20">
+            <a:extLst>
+              <a:ext uri="{FF2B5EF4-FFF2-40B4-BE49-F238E27FC236}">
+                <a16:creationId xmlns:a16="http://schemas.microsoft.com/office/drawing/2014/main" id="{90C0C0D1-E79A-41FF-8322-256F6DD1499B}"/>
+              </a:ext>
+              <a:ext uri="{C183D7F6-B498-43B3-948B-1728B52AA6E4}">
+                <adec:decorative xmlns:adec="http://schemas.microsoft.com/office/drawing/2017/decorative" val="1"/>
+              </a:ext>
+            </a:extLst>
+          </p:cNvPr>
+          <p:cNvSpPr>
+            <a:spLocks noGrp="1" noRot="1" noChangeAspect="1" noMove="1" noResize="1" noEditPoints="1" noAdjustHandles="1" noChangeArrowheads="1" noChangeShapeType="1" noTextEdit="1"/>
+          </p:cNvSpPr>
+          <p:nvPr>
+            <p:extLst>
+              <p:ext uri="{386F3935-93C4-4BCD-93E2-E3B085C9AB24}">
+                <p16:designElem xmlns:p16="http://schemas.microsoft.com/office/powerpoint/2015/main" val="1"/>
+              </p:ext>
+            </p:extLst>
+          </p:nvPr>
+        </p:nvSpPr>
+        <p:spPr>
+          <a:xfrm>
+            <a:off x="0" y="585216"/>
+            <a:ext cx="128016" cy="704088"/>
+          </a:xfrm>
+          <a:prstGeom prst="rect">
             <a:avLst/>
           </a:prstGeom>
+          <a:solidFill>
+            <a:schemeClr val="accent1"/>
+          </a:solidFill>
+          <a:ln>
+            <a:noFill/>
+          </a:ln>
         </p:spPr>
         <p:style>
           <a:lnRef idx="2">
@@ -9637,43 +9683,169 @@
           <a:bodyPr rtlCol="0" anchor="ctr"/>
           <a:lstStyle/>
           <a:p>
-            <a:pPr algn="ctr"/>
-            <a:endParaRPr lang="it-IT"/>
-          </a:p>
-        </p:txBody>
-      </p:sp>
-      <p:sp>
-        <p:nvSpPr>
-          <p:cNvPr id="5" name="Arrow: Right 4">
-            <a:extLst>
-              <a:ext uri="{FF2B5EF4-FFF2-40B4-BE49-F238E27FC236}">
-                <a16:creationId xmlns:a16="http://schemas.microsoft.com/office/drawing/2014/main" id="{4B471671-866F-77EF-3CC3-D41AC284B594}"/>
-              </a:ext>
-            </a:extLst>
-          </p:cNvPr>
-          <p:cNvSpPr/>
+            <a:pPr marL="0" marR="0" lvl="0" indent="0" algn="ctr" defTabSz="914400" rtl="0" eaLnBrk="1" fontAlgn="auto" latinLnBrk="0" hangingPunct="1">
+              <a:lnSpc>
+                <a:spcPct val="100000"/>
+              </a:lnSpc>
+              <a:spcBef>
+                <a:spcPts val="0"/>
+              </a:spcBef>
+              <a:spcAft>
+                <a:spcPts val="0"/>
+              </a:spcAft>
+              <a:buClrTx/>
+              <a:buSzTx/>
+              <a:buFontTx/>
+              <a:buNone/>
+              <a:tabLst/>
+              <a:defRPr/>
+            </a:pPr>
+            <a:endParaRPr kumimoji="0" lang="en-US" sz="1800" b="0" i="0" u="none" strike="noStrike" kern="1200" cap="none" spc="0" normalizeH="0" baseline="0" noProof="0">
+              <a:ln>
+                <a:noFill/>
+              </a:ln>
+              <a:solidFill>
+                <a:prstClr val="white"/>
+              </a:solidFill>
+              <a:effectLst/>
+              <a:uLnTx/>
+              <a:uFillTx/>
+              <a:latin typeface="Calibri" panose="020F0502020204030204"/>
+              <a:ea typeface="+mn-ea"/>
+              <a:cs typeface="+mn-cs"/>
+            </a:endParaRPr>
+          </a:p>
+        </p:txBody>
+      </p:sp>
+      <p:pic>
+        <p:nvPicPr>
+          <p:cNvPr id="12" name="Picture 11">
+            <a:extLst>
+              <a:ext uri="{FF2B5EF4-FFF2-40B4-BE49-F238E27FC236}">
+                <a16:creationId xmlns:a16="http://schemas.microsoft.com/office/drawing/2014/main" id="{4E995504-A4AE-E8F2-9687-5EF5B88F6D28}"/>
+              </a:ext>
+            </a:extLst>
+          </p:cNvPr>
+          <p:cNvPicPr>
+            <a:picLocks noChangeAspect="1"/>
+          </p:cNvPicPr>
           <p:nvPr/>
-        </p:nvSpPr>
+        </p:nvPicPr>
+        <p:blipFill rotWithShape="1">
+          <a:blip r:embed="rId2">
+            <a:extLst>
+              <a:ext uri="{28A0092B-C50C-407E-A947-70E740481C1C}">
+                <a14:useLocalDpi xmlns:a14="http://schemas.microsoft.com/office/drawing/2010/main" val="0"/>
+              </a:ext>
+            </a:extLst>
+          </a:blip>
+          <a:srcRect t="11023" r="3" b="7355"/>
+          <a:stretch/>
+        </p:blipFill>
         <p:spPr>
           <a:xfrm>
-            <a:off x="5519651" y="4181302"/>
-            <a:ext cx="1163782" cy="523702"/>
+            <a:off x="429767" y="1721922"/>
+            <a:ext cx="3419856" cy="4520560"/>
           </a:xfrm>
-          <a:prstGeom prst="rightArrow">
+          <a:prstGeom prst="rect">
             <a:avLst/>
           </a:prstGeom>
         </p:spPr>
+      </p:pic>
+      <p:pic>
+        <p:nvPicPr>
+          <p:cNvPr id="10" name="Picture 9" descr="A picture containing screenshot, solar cell, panel&#10;&#10;Description automatically generated">
+            <a:extLst>
+              <a:ext uri="{FF2B5EF4-FFF2-40B4-BE49-F238E27FC236}">
+                <a16:creationId xmlns:a16="http://schemas.microsoft.com/office/drawing/2014/main" id="{26901A51-6871-8BB9-6D8A-210120AE9554}"/>
+              </a:ext>
+            </a:extLst>
+          </p:cNvPr>
+          <p:cNvPicPr>
+            <a:picLocks noChangeAspect="1"/>
+          </p:cNvPicPr>
+          <p:nvPr/>
+        </p:nvPicPr>
+        <p:blipFill rotWithShape="1">
+          <a:blip r:embed="rId3">
+            <a:extLst>
+              <a:ext uri="{28A0092B-C50C-407E-A947-70E740481C1C}">
+                <a14:useLocalDpi xmlns:a14="http://schemas.microsoft.com/office/drawing/2010/main" val="0"/>
+              </a:ext>
+            </a:extLst>
+          </a:blip>
+          <a:srcRect l="10218" r="6628" b="-4"/>
+          <a:stretch/>
+        </p:blipFill>
+        <p:spPr>
+          <a:xfrm>
+            <a:off x="4226837" y="1721922"/>
+            <a:ext cx="3420596" cy="4520560"/>
+          </a:xfrm>
+          <a:prstGeom prst="rect">
+            <a:avLst/>
+          </a:prstGeom>
+        </p:spPr>
+      </p:pic>
+      <p:sp useBgFill="1">
+        <p:nvSpPr>
+          <p:cNvPr id="23" name="Rectangle 22">
+            <a:extLst>
+              <a:ext uri="{FF2B5EF4-FFF2-40B4-BE49-F238E27FC236}">
+                <a16:creationId xmlns:a16="http://schemas.microsoft.com/office/drawing/2014/main" id="{395FA420-5595-49D1-9D5F-79EC43B55574}"/>
+              </a:ext>
+              <a:ext uri="{C183D7F6-B498-43B3-948B-1728B52AA6E4}">
+                <adec:decorative xmlns:adec="http://schemas.microsoft.com/office/drawing/2017/decorative" val="1"/>
+              </a:ext>
+            </a:extLst>
+          </p:cNvPr>
+          <p:cNvSpPr>
+            <a:spLocks noGrp="1" noRot="1" noChangeAspect="1" noMove="1" noResize="1" noEditPoints="1" noAdjustHandles="1" noChangeArrowheads="1" noChangeShapeType="1" noTextEdit="1"/>
+          </p:cNvSpPr>
+          <p:nvPr>
+            <p:extLst>
+              <p:ext uri="{386F3935-93C4-4BCD-93E2-E3B085C9AB24}">
+                <p16:designElem xmlns:p16="http://schemas.microsoft.com/office/powerpoint/2015/main" val="1"/>
+              </p:ext>
+            </p:extLst>
+          </p:nvPr>
+        </p:nvSpPr>
+        <p:spPr>
+          <a:xfrm>
+            <a:off x="8024648" y="1721922"/>
+            <a:ext cx="3609143" cy="4520560"/>
+          </a:xfrm>
+          <a:prstGeom prst="rect">
+            <a:avLst/>
+          </a:prstGeom>
+          <a:ln w="9525">
+            <a:solidFill>
+              <a:schemeClr val="tx2">
+                <a:lumMod val="10000"/>
+                <a:lumOff val="90000"/>
+              </a:schemeClr>
+            </a:solidFill>
+          </a:ln>
+          <a:effectLst>
+            <a:outerShdw blurRad="50800" dist="38100" dir="2700000" algn="tl" rotWithShape="0">
+              <a:schemeClr val="bg1">
+                <a:lumMod val="85000"/>
+                <a:alpha val="30000"/>
+              </a:schemeClr>
+            </a:outerShdw>
+          </a:effectLst>
+        </p:spPr>
         <p:style>
           <a:lnRef idx="2">
-            <a:schemeClr val="dk1">
+            <a:schemeClr val="accent1">
               <a:shade val="50000"/>
             </a:schemeClr>
           </a:lnRef>
           <a:fillRef idx="1">
-            <a:schemeClr val="dk1"/>
+            <a:schemeClr val="accent1"/>
           </a:fillRef>
           <a:effectRef idx="0">
-            <a:schemeClr val="dk1"/>
+            <a:schemeClr val="accent1"/>
           </a:effectRef>
           <a:fontRef idx="minor">
             <a:schemeClr val="lt1"/>
@@ -9683,17 +9855,46 @@
           <a:bodyPr rtlCol="0" anchor="ctr"/>
           <a:lstStyle/>
           <a:p>
-            <a:pPr algn="ctr"/>
-            <a:endParaRPr lang="it-IT"/>
-          </a:p>
-        </p:txBody>
-      </p:sp>
-      <p:sp>
-        <p:nvSpPr>
-          <p:cNvPr id="6" name="TextBox 5">
-            <a:extLst>
-              <a:ext uri="{FF2B5EF4-FFF2-40B4-BE49-F238E27FC236}">
-                <a16:creationId xmlns:a16="http://schemas.microsoft.com/office/drawing/2014/main" id="{DAC31680-9613-2C0F-3B17-82D3FAAD4627}"/>
+            <a:pPr marL="0" marR="0" lvl="0" indent="0" algn="ctr" defTabSz="914400" rtl="0" eaLnBrk="1" fontAlgn="auto" latinLnBrk="0" hangingPunct="1">
+              <a:lnSpc>
+                <a:spcPct val="100000"/>
+              </a:lnSpc>
+              <a:spcBef>
+                <a:spcPts val="0"/>
+              </a:spcBef>
+              <a:spcAft>
+                <a:spcPts val="0"/>
+              </a:spcAft>
+              <a:buClrTx/>
+              <a:buSzTx/>
+              <a:buFontTx/>
+              <a:buNone/>
+              <a:tabLst/>
+              <a:defRPr/>
+            </a:pPr>
+            <a:endParaRPr kumimoji="0" lang="en-US" sz="1800" b="0" i="0" u="none" strike="noStrike" kern="1200" cap="none" spc="0" normalizeH="0" baseline="0" noProof="0">
+              <a:ln>
+                <a:noFill/>
+              </a:ln>
+              <a:solidFill>
+                <a:prstClr val="white"/>
+              </a:solidFill>
+              <a:effectLst/>
+              <a:uLnTx/>
+              <a:uFillTx/>
+              <a:latin typeface="Calibri" panose="020F0502020204030204"/>
+              <a:ea typeface="+mn-ea"/>
+              <a:cs typeface="+mn-cs"/>
+            </a:endParaRPr>
+          </a:p>
+        </p:txBody>
+      </p:sp>
+      <p:sp>
+        <p:nvSpPr>
+          <p:cNvPr id="14" name="TextBox 13">
+            <a:extLst>
+              <a:ext uri="{FF2B5EF4-FFF2-40B4-BE49-F238E27FC236}">
+                <a16:creationId xmlns:a16="http://schemas.microsoft.com/office/drawing/2014/main" id="{70DC081A-A229-329D-E2C5-855461E2125B}"/>
               </a:ext>
             </a:extLst>
           </p:cNvPr>
@@ -9702,8 +9903,50 @@
         </p:nvSpPr>
         <p:spPr>
           <a:xfrm>
-            <a:off x="1022465" y="2851265"/>
-            <a:ext cx="3948546" cy="382386"/>
+            <a:off x="8309348" y="2020824"/>
+            <a:ext cx="2956060" cy="3959352"/>
+          </a:xfrm>
+          <a:prstGeom prst="rect">
+            <a:avLst/>
+          </a:prstGeom>
+        </p:spPr>
+        <p:txBody>
+          <a:bodyPr vert="horz" lIns="91440" tIns="45720" rIns="91440" bIns="45720" rtlCol="0" anchor="ctr">
+            <a:normAutofit/>
+          </a:bodyPr>
+          <a:lstStyle/>
+          <a:p>
+            <a:pPr defTabSz="914400">
+              <a:lnSpc>
+                <a:spcPct val="110000"/>
+              </a:lnSpc>
+              <a:spcAft>
+                <a:spcPts val="600"/>
+              </a:spcAft>
+            </a:pPr>
+            <a:r>
+              <a:rPr lang="en-US" sz="1700" dirty="0"/>
+              <a:t>To generate more realistic simulations and evaluate the increase or decrease in system performance caused by various environmental and weather conditions, a kind of mismatch generator is also used between the different panels within a string or across the entire parallel configuration, as shown in the figures.</a:t>
+            </a:r>
+          </a:p>
+        </p:txBody>
+      </p:sp>
+      <p:sp>
+        <p:nvSpPr>
+          <p:cNvPr id="13" name="TextBox 12">
+            <a:extLst>
+              <a:ext uri="{FF2B5EF4-FFF2-40B4-BE49-F238E27FC236}">
+                <a16:creationId xmlns:a16="http://schemas.microsoft.com/office/drawing/2014/main" id="{39A4DC51-A198-0D1E-C039-96382E268233}"/>
+              </a:ext>
+            </a:extLst>
+          </p:cNvPr>
+          <p:cNvSpPr txBox="1"/>
+          <p:nvPr/>
+        </p:nvSpPr>
+        <p:spPr>
+          <a:xfrm>
+            <a:off x="5637178" y="3049621"/>
+            <a:ext cx="65" cy="276999"/>
           </a:xfrm>
           <a:prstGeom prst="rect">
             <a:avLst/>
@@ -9711,111 +9954,37 @@
           <a:noFill/>
         </p:spPr>
         <p:txBody>
-          <a:bodyPr wrap="square" rtlCol="0">
+          <a:bodyPr wrap="none" lIns="0" tIns="0" rIns="0" bIns="0" rtlCol="0">
             <a:spAutoFit/>
           </a:bodyPr>
           <a:lstStyle/>
           <a:p>
-            <a:pPr algn="ctr"/>
-            <a:r>
-              <a:rPr lang="it-IT" dirty="0"/>
-              <a:t>Input</a:t>
-            </a:r>
-          </a:p>
-        </p:txBody>
-      </p:sp>
-      <p:sp>
-        <p:nvSpPr>
-          <p:cNvPr id="7" name="TextBox 6">
-            <a:extLst>
-              <a:ext uri="{FF2B5EF4-FFF2-40B4-BE49-F238E27FC236}">
-                <a16:creationId xmlns:a16="http://schemas.microsoft.com/office/drawing/2014/main" id="{845CD37C-B9D6-D0DA-1ACC-0BF09685DA0F}"/>
-              </a:ext>
-            </a:extLst>
-          </p:cNvPr>
-          <p:cNvSpPr txBox="1"/>
-          <p:nvPr/>
-        </p:nvSpPr>
-        <p:spPr>
-          <a:xfrm>
-            <a:off x="7254241" y="2851265"/>
-            <a:ext cx="3948546" cy="382386"/>
-          </a:xfrm>
-          <a:prstGeom prst="rect">
-            <a:avLst/>
-          </a:prstGeom>
-          <a:noFill/>
-        </p:spPr>
-        <p:txBody>
-          <a:bodyPr wrap="square" rtlCol="0">
-            <a:spAutoFit/>
-          </a:bodyPr>
-          <a:lstStyle/>
-          <a:p>
-            <a:pPr algn="ctr"/>
-            <a:r>
-              <a:rPr lang="it-IT" dirty="0"/>
-              <a:t>Output</a:t>
-            </a:r>
-          </a:p>
-        </p:txBody>
-      </p:sp>
-      <p:sp>
-        <p:nvSpPr>
-          <p:cNvPr id="8" name="Arrow: Right 7">
-            <a:extLst>
-              <a:ext uri="{FF2B5EF4-FFF2-40B4-BE49-F238E27FC236}">
-                <a16:creationId xmlns:a16="http://schemas.microsoft.com/office/drawing/2014/main" id="{F5F79632-4F35-EF39-7927-2F5CD10BD189}"/>
-              </a:ext>
-            </a:extLst>
-          </p:cNvPr>
-          <p:cNvSpPr/>
-          <p:nvPr/>
-        </p:nvSpPr>
-        <p:spPr>
-          <a:xfrm>
-            <a:off x="-681643" y="4177144"/>
-            <a:ext cx="1163782" cy="523702"/>
-          </a:xfrm>
-          <a:prstGeom prst="rightArrow">
-            <a:avLst/>
-          </a:prstGeom>
-        </p:spPr>
-        <p:style>
-          <a:lnRef idx="2">
-            <a:schemeClr val="dk1">
-              <a:shade val="50000"/>
-            </a:schemeClr>
-          </a:lnRef>
-          <a:fillRef idx="1">
-            <a:schemeClr val="dk1"/>
-          </a:fillRef>
-          <a:effectRef idx="0">
-            <a:schemeClr val="dk1"/>
-          </a:effectRef>
-          <a:fontRef idx="minor">
-            <a:schemeClr val="lt1"/>
-          </a:fontRef>
-        </p:style>
-        <p:txBody>
-          <a:bodyPr rtlCol="0" anchor="ctr"/>
-          <a:lstStyle/>
-          <a:p>
-            <a:pPr algn="ctr"/>
-            <a:endParaRPr lang="it-IT"/>
+            <a:endParaRPr lang="it-IT" dirty="0"/>
           </a:p>
         </p:txBody>
       </p:sp>
     </p:spTree>
     <p:extLst>
       <p:ext uri="{BB962C8B-B14F-4D97-AF65-F5344CB8AC3E}">
-        <p14:creationId xmlns:p14="http://schemas.microsoft.com/office/powerpoint/2010/main" val="3459628496"/>
+        <p14:creationId xmlns:p14="http://schemas.microsoft.com/office/powerpoint/2010/main" val="602783968"/>
       </p:ext>
     </p:extLst>
   </p:cSld>
   <p:clrMapOvr>
     <a:masterClrMapping/>
   </p:clrMapOvr>
+  <mc:AlternateContent xmlns:mc="http://schemas.openxmlformats.org/markup-compatibility/2006" xmlns:p159="http://schemas.microsoft.com/office/powerpoint/2015/09/main">
+    <mc:Choice Requires="p159">
+      <p:transition xmlns:p14="http://schemas.microsoft.com/office/powerpoint/2010/main" spd="slow" p14:dur="2000">
+        <p159:morph option="byObject"/>
+      </p:transition>
+    </mc:Choice>
+    <mc:Fallback xmlns="">
+      <p:transition spd="slow">
+        <p:fade/>
+      </p:transition>
+    </mc:Fallback>
+  </mc:AlternateContent>
 </p:sld>
 </file>
 
@@ -9994,13 +10163,13 @@
   <p:clrMapOvr>
     <a:masterClrMapping/>
   </p:clrMapOvr>
-  <mc:AlternateContent xmlns:mc="http://schemas.openxmlformats.org/markup-compatibility/2006">
-    <mc:Choice xmlns:p159="http://schemas.microsoft.com/office/powerpoint/2015/09/main" Requires="p159">
+  <mc:AlternateContent xmlns:mc="http://schemas.openxmlformats.org/markup-compatibility/2006" xmlns:p159="http://schemas.microsoft.com/office/powerpoint/2015/09/main">
+    <mc:Choice Requires="p159">
       <p:transition xmlns:p14="http://schemas.microsoft.com/office/powerpoint/2010/main" spd="slow" p14:dur="2000">
         <p159:morph option="byObject"/>
       </p:transition>
     </mc:Choice>
-    <mc:Fallback>
+    <mc:Fallback xmlns="">
       <p:transition spd="slow">
         <p:fade/>
       </p:transition>
@@ -10187,13 +10356,13 @@
   <p:clrMapOvr>
     <a:masterClrMapping/>
   </p:clrMapOvr>
-  <mc:AlternateContent xmlns:mc="http://schemas.openxmlformats.org/markup-compatibility/2006">
-    <mc:Choice xmlns:p159="http://schemas.microsoft.com/office/powerpoint/2015/09/main" Requires="p159">
+  <mc:AlternateContent xmlns:mc="http://schemas.openxmlformats.org/markup-compatibility/2006" xmlns:p159="http://schemas.microsoft.com/office/powerpoint/2015/09/main">
+    <mc:Choice Requires="p159">
       <p:transition xmlns:p14="http://schemas.microsoft.com/office/powerpoint/2010/main" spd="slow" p14:dur="2000">
         <p159:morph option="byObject"/>
       </p:transition>
     </mc:Choice>
-    <mc:Fallback>
+    <mc:Fallback xmlns="">
       <p:transition spd="slow">
         <p:fade/>
       </p:transition>
@@ -10380,13 +10549,13 @@
   <p:clrMapOvr>
     <a:masterClrMapping/>
   </p:clrMapOvr>
-  <mc:AlternateContent xmlns:mc="http://schemas.openxmlformats.org/markup-compatibility/2006">
-    <mc:Choice xmlns:p159="http://schemas.microsoft.com/office/powerpoint/2015/09/main" Requires="p159">
+  <mc:AlternateContent xmlns:mc="http://schemas.openxmlformats.org/markup-compatibility/2006" xmlns:p159="http://schemas.microsoft.com/office/powerpoint/2015/09/main">
+    <mc:Choice Requires="p159">
       <p:transition xmlns:p14="http://schemas.microsoft.com/office/powerpoint/2010/main" spd="slow" p14:dur="2000">
         <p159:morph option="byObject"/>
       </p:transition>
     </mc:Choice>
-    <mc:Fallback>
+    <mc:Fallback xmlns="">
       <p:transition spd="slow">
         <p:fade/>
       </p:transition>
@@ -10570,13 +10739,13 @@
   <p:clrMapOvr>
     <a:masterClrMapping/>
   </p:clrMapOvr>
-  <mc:AlternateContent xmlns:mc="http://schemas.openxmlformats.org/markup-compatibility/2006">
-    <mc:Choice xmlns:p159="http://schemas.microsoft.com/office/powerpoint/2015/09/main" Requires="p159">
+  <mc:AlternateContent xmlns:mc="http://schemas.openxmlformats.org/markup-compatibility/2006" xmlns:p159="http://schemas.microsoft.com/office/powerpoint/2015/09/main">
+    <mc:Choice Requires="p159">
       <p:transition xmlns:p14="http://schemas.microsoft.com/office/powerpoint/2010/main" spd="slow" p14:dur="2000">
         <p159:morph option="byObject"/>
       </p:transition>
     </mc:Choice>
-    <mc:Fallback>
+    <mc:Fallback xmlns="">
       <p:transition spd="slow">
         <p:fade/>
       </p:transition>
@@ -10763,13 +10932,13 @@
   <p:clrMapOvr>
     <a:masterClrMapping/>
   </p:clrMapOvr>
-  <mc:AlternateContent xmlns:mc="http://schemas.openxmlformats.org/markup-compatibility/2006">
-    <mc:Choice xmlns:p159="http://schemas.microsoft.com/office/powerpoint/2015/09/main" Requires="p159">
+  <mc:AlternateContent xmlns:mc="http://schemas.openxmlformats.org/markup-compatibility/2006" xmlns:p159="http://schemas.microsoft.com/office/powerpoint/2015/09/main">
+    <mc:Choice Requires="p159">
       <p:transition xmlns:p14="http://schemas.microsoft.com/office/powerpoint/2010/main" spd="slow" p14:dur="2000">
         <p159:morph option="byObject"/>
       </p:transition>
     </mc:Choice>
-    <mc:Fallback>
+    <mc:Fallback xmlns="">
       <p:transition spd="slow">
         <p:fade/>
       </p:transition>
@@ -10956,13 +11125,13 @@
   <p:clrMapOvr>
     <a:masterClrMapping/>
   </p:clrMapOvr>
-  <mc:AlternateContent xmlns:mc="http://schemas.openxmlformats.org/markup-compatibility/2006">
-    <mc:Choice xmlns:p159="http://schemas.microsoft.com/office/powerpoint/2015/09/main" Requires="p159">
+  <mc:AlternateContent xmlns:mc="http://schemas.openxmlformats.org/markup-compatibility/2006" xmlns:p159="http://schemas.microsoft.com/office/powerpoint/2015/09/main">
+    <mc:Choice Requires="p159">
       <p:transition xmlns:p14="http://schemas.microsoft.com/office/powerpoint/2010/main" spd="slow" p14:dur="2000">
         <p159:morph option="byObject"/>
       </p:transition>
     </mc:Choice>
-    <mc:Fallback>
+    <mc:Fallback xmlns="">
       <p:transition spd="slow">
         <p:fade/>
       </p:transition>
@@ -11146,13 +11315,13 @@
   <p:clrMapOvr>
     <a:masterClrMapping/>
   </p:clrMapOvr>
-  <mc:AlternateContent xmlns:mc="http://schemas.openxmlformats.org/markup-compatibility/2006">
-    <mc:Choice xmlns:p159="http://schemas.microsoft.com/office/powerpoint/2015/09/main" Requires="p159">
+  <mc:AlternateContent xmlns:mc="http://schemas.openxmlformats.org/markup-compatibility/2006" xmlns:p159="http://schemas.microsoft.com/office/powerpoint/2015/09/main">
+    <mc:Choice Requires="p159">
       <p:transition xmlns:p14="http://schemas.microsoft.com/office/powerpoint/2010/main" spd="slow" p14:dur="2000">
         <p159:morph option="byObject"/>
       </p:transition>
     </mc:Choice>
-    <mc:Fallback>
+    <mc:Fallback xmlns="">
       <p:transition spd="slow">
         <p:fade/>
       </p:transition>
@@ -11339,13 +11508,13 @@
   <p:clrMapOvr>
     <a:masterClrMapping/>
   </p:clrMapOvr>
-  <mc:AlternateContent xmlns:mc="http://schemas.openxmlformats.org/markup-compatibility/2006">
-    <mc:Choice xmlns:p159="http://schemas.microsoft.com/office/powerpoint/2015/09/main" Requires="p159">
+  <mc:AlternateContent xmlns:mc="http://schemas.openxmlformats.org/markup-compatibility/2006" xmlns:p159="http://schemas.microsoft.com/office/powerpoint/2015/09/main">
+    <mc:Choice Requires="p159">
       <p:transition xmlns:p14="http://schemas.microsoft.com/office/powerpoint/2010/main" spd="slow" p14:dur="2000">
         <p159:morph option="byObject"/>
       </p:transition>
     </mc:Choice>
-    <mc:Fallback>
+    <mc:Fallback xmlns="">
       <p:transition spd="slow">
         <p:fade/>
       </p:transition>
@@ -11532,13 +11701,13 @@
   <p:clrMapOvr>
     <a:masterClrMapping/>
   </p:clrMapOvr>
-  <mc:AlternateContent xmlns:mc="http://schemas.openxmlformats.org/markup-compatibility/2006">
-    <mc:Choice xmlns:p159="http://schemas.microsoft.com/office/powerpoint/2015/09/main" Requires="p159">
+  <mc:AlternateContent xmlns:mc="http://schemas.openxmlformats.org/markup-compatibility/2006" xmlns:p159="http://schemas.microsoft.com/office/powerpoint/2015/09/main">
+    <mc:Choice Requires="p159">
       <p:transition xmlns:p14="http://schemas.microsoft.com/office/powerpoint/2010/main" spd="slow" p14:dur="2000">
         <p159:morph option="byObject"/>
       </p:transition>
     </mc:Choice>
-    <mc:Fallback>
+    <mc:Fallback xmlns="">
       <p:transition spd="slow">
         <p:fade/>
       </p:transition>
@@ -11936,13 +12105,13 @@
   <p:clrMapOvr>
     <a:masterClrMapping/>
   </p:clrMapOvr>
-  <mc:AlternateContent xmlns:mc="http://schemas.openxmlformats.org/markup-compatibility/2006">
-    <mc:Choice xmlns:p159="http://schemas.microsoft.com/office/powerpoint/2015/09/main" Requires="p159">
+  <mc:AlternateContent xmlns:mc="http://schemas.openxmlformats.org/markup-compatibility/2006" xmlns:p159="http://schemas.microsoft.com/office/powerpoint/2015/09/main">
+    <mc:Choice Requires="p159">
       <p:transition xmlns:p14="http://schemas.microsoft.com/office/powerpoint/2010/main" spd="slow" p14:dur="2000">
         <p159:morph option="byObject"/>
       </p:transition>
     </mc:Choice>
-    <mc:Fallback>
+    <mc:Fallback xmlns="">
       <p:transition spd="slow">
         <p:fade/>
       </p:transition>
@@ -12032,6 +12201,18 @@
   <p:clrMapOvr>
     <a:masterClrMapping/>
   </p:clrMapOvr>
+  <mc:AlternateContent xmlns:mc="http://schemas.openxmlformats.org/markup-compatibility/2006" xmlns:p159="http://schemas.microsoft.com/office/powerpoint/2015/09/main">
+    <mc:Choice Requires="p159">
+      <p:transition xmlns:p14="http://schemas.microsoft.com/office/powerpoint/2010/main" spd="slow" p14:dur="2000">
+        <p159:morph option="byObject"/>
+      </p:transition>
+    </mc:Choice>
+    <mc:Fallback xmlns="">
+      <p:transition spd="slow">
+        <p:fade/>
+      </p:transition>
+    </mc:Fallback>
+  </mc:AlternateContent>
 </p:sld>
 </file>
 
@@ -12116,6 +12297,18 @@
   <p:clrMapOvr>
     <a:masterClrMapping/>
   </p:clrMapOvr>
+  <mc:AlternateContent xmlns:mc="http://schemas.openxmlformats.org/markup-compatibility/2006" xmlns:p159="http://schemas.microsoft.com/office/powerpoint/2015/09/main">
+    <mc:Choice Requires="p159">
+      <p:transition xmlns:p14="http://schemas.microsoft.com/office/powerpoint/2010/main" spd="slow" p14:dur="2000">
+        <p159:morph option="byObject"/>
+      </p:transition>
+    </mc:Choice>
+    <mc:Fallback xmlns="">
+      <p:transition spd="slow">
+        <p:fade/>
+      </p:transition>
+    </mc:Fallback>
+  </mc:AlternateContent>
 </p:sld>
 </file>
 
@@ -12200,13 +12393,13 @@
   <p:clrMapOvr>
     <a:masterClrMapping/>
   </p:clrMapOvr>
-  <mc:AlternateContent xmlns:mc="http://schemas.openxmlformats.org/markup-compatibility/2006">
-    <mc:Choice xmlns:p159="http://schemas.microsoft.com/office/powerpoint/2015/09/main" Requires="p159">
+  <mc:AlternateContent xmlns:mc="http://schemas.openxmlformats.org/markup-compatibility/2006" xmlns:p159="http://schemas.microsoft.com/office/powerpoint/2015/09/main">
+    <mc:Choice Requires="p159">
       <p:transition xmlns:p14="http://schemas.microsoft.com/office/powerpoint/2010/main" spd="slow" p14:dur="2000">
         <p159:morph option="byObject"/>
       </p:transition>
     </mc:Choice>
-    <mc:Fallback>
+    <mc:Fallback xmlns="">
       <p:transition spd="slow">
         <p:fade/>
       </p:transition>
@@ -12216,126 +12409,6 @@
 </file>
 
 <file path=ppt/slides/slide4.xml><?xml version="1.0" encoding="utf-8"?>
-<p:sld xmlns:a="http://schemas.openxmlformats.org/drawingml/2006/main" xmlns:r="http://schemas.openxmlformats.org/officeDocument/2006/relationships" xmlns:p="http://schemas.openxmlformats.org/presentationml/2006/main">
-  <p:cSld>
-    <p:spTree>
-      <p:nvGrpSpPr>
-        <p:cNvPr id="1" name=""/>
-        <p:cNvGrpSpPr/>
-        <p:nvPr/>
-      </p:nvGrpSpPr>
-      <p:grpSpPr>
-        <a:xfrm>
-          <a:off x="0" y="0"/>
-          <a:ext cx="0" cy="0"/>
-          <a:chOff x="0" y="0"/>
-          <a:chExt cx="0" cy="0"/>
-        </a:xfrm>
-      </p:grpSpPr>
-      <p:sp>
-        <p:nvSpPr>
-          <p:cNvPr id="2" name="Titolo 1">
-            <a:extLst>
-              <a:ext uri="{FF2B5EF4-FFF2-40B4-BE49-F238E27FC236}">
-                <a16:creationId xmlns:a16="http://schemas.microsoft.com/office/drawing/2014/main" id="{154454CD-4916-8E1F-2D56-52B0118C0DEE}"/>
-              </a:ext>
-            </a:extLst>
-          </p:cNvPr>
-          <p:cNvSpPr>
-            <a:spLocks noGrp="1"/>
-          </p:cNvSpPr>
-          <p:nvPr>
-            <p:ph type="title"/>
-          </p:nvPr>
-        </p:nvSpPr>
-        <p:spPr/>
-        <p:txBody>
-          <a:bodyPr/>
-          <a:lstStyle/>
-          <a:p>
-            <a:r>
-              <a:rPr lang="it-IT" dirty="0" err="1"/>
-              <a:t>Theoretical</a:t>
-            </a:r>
-            <a:r>
-              <a:rPr lang="it-IT" dirty="0"/>
-              <a:t> </a:t>
-            </a:r>
-            <a:r>
-              <a:rPr lang="it-IT" dirty="0" err="1"/>
-              <a:t>outlines</a:t>
-            </a:r>
-            <a:endParaRPr lang="it-IT" dirty="0"/>
-          </a:p>
-        </p:txBody>
-      </p:sp>
-      <p:sp>
-        <p:nvSpPr>
-          <p:cNvPr id="3" name="Segnaposto contenuto 2">
-            <a:extLst>
-              <a:ext uri="{FF2B5EF4-FFF2-40B4-BE49-F238E27FC236}">
-                <a16:creationId xmlns:a16="http://schemas.microsoft.com/office/drawing/2014/main" id="{2484187F-7A4E-4444-413F-BEC1589BC1AB}"/>
-              </a:ext>
-            </a:extLst>
-          </p:cNvPr>
-          <p:cNvSpPr>
-            <a:spLocks noGrp="1"/>
-          </p:cNvSpPr>
-          <p:nvPr>
-            <p:ph idx="1"/>
-          </p:nvPr>
-        </p:nvSpPr>
-        <p:spPr/>
-        <p:txBody>
-          <a:bodyPr/>
-          <a:lstStyle/>
-          <a:p>
-            <a:r>
-              <a:rPr lang="it-IT" dirty="0"/>
-              <a:t>Accenni sui pannelli </a:t>
-            </a:r>
-          </a:p>
-          <a:p>
-            <a:r>
-              <a:rPr lang="it-IT" dirty="0"/>
-              <a:t>Come funziona MPPT </a:t>
-            </a:r>
-            <a:r>
-              <a:rPr lang="it-IT"/>
-              <a:t>in generale</a:t>
-            </a:r>
-          </a:p>
-          <a:p>
-            <a:endParaRPr lang="it-IT" dirty="0"/>
-          </a:p>
-        </p:txBody>
-      </p:sp>
-    </p:spTree>
-    <p:extLst>
-      <p:ext uri="{BB962C8B-B14F-4D97-AF65-F5344CB8AC3E}">
-        <p14:creationId xmlns:p14="http://schemas.microsoft.com/office/powerpoint/2010/main" val="3146612451"/>
-      </p:ext>
-    </p:extLst>
-  </p:cSld>
-  <p:clrMapOvr>
-    <a:masterClrMapping/>
-  </p:clrMapOvr>
-  <mc:AlternateContent xmlns:mc="http://schemas.openxmlformats.org/markup-compatibility/2006">
-    <mc:Choice xmlns:p159="http://schemas.microsoft.com/office/powerpoint/2015/09/main" Requires="p159">
-      <p:transition xmlns:p14="http://schemas.microsoft.com/office/powerpoint/2010/main" spd="slow" p14:dur="2000">
-        <p159:morph option="byObject"/>
-      </p:transition>
-    </mc:Choice>
-    <mc:Fallback>
-      <p:transition spd="slow">
-        <p:fade/>
-      </p:transition>
-    </mc:Fallback>
-  </mc:AlternateContent>
-</p:sld>
-</file>
-
-<file path=ppt/slides/slide5.xml><?xml version="1.0" encoding="utf-8"?>
 <p:sld xmlns:a="http://schemas.openxmlformats.org/drawingml/2006/main" xmlns:r="http://schemas.openxmlformats.org/officeDocument/2006/relationships" xmlns:p="http://schemas.openxmlformats.org/presentationml/2006/main">
   <p:cSld>
     <p:bg>
@@ -12787,7 +12860,7 @@
           <a:lstStyle/>
           <a:p>
             <a:r>
-              <a:rPr lang="en-US" sz="2800"/>
+              <a:rPr lang="en-US" sz="2800" dirty="0"/>
               <a:t>Code structure</a:t>
             </a:r>
           </a:p>
@@ -13008,82 +13081,85 @@
           </a:bodyPr>
           <a:lstStyle/>
           <a:p>
-            <a:pPr indent="-228600" defTabSz="914400">
+            <a:pPr defTabSz="914400">
               <a:spcAft>
                 <a:spcPts val="600"/>
               </a:spcAft>
-              <a:buFont typeface="Arial" panose="020B0604020202020204" pitchFamily="34" charset="0"/>
-              <a:buChar char="•"/>
             </a:pPr>
             <a:r>
-              <a:rPr lang="en-US" sz="1700"/>
-              <a:t>Per l’implementazione del sistema e dei moduli di ottimizzazione sono state necessarie 4 classi e una libreria di utilità:</a:t>
+              <a:rPr lang="en-US" sz="1700" dirty="0"/>
+              <a:t>For the implementation of the system and optimization modules, 4 classes and a utility library were required:</a:t>
             </a:r>
           </a:p>
           <a:p>
-            <a:pPr marL="285750" indent="-228600" defTabSz="914400">
+            <a:pPr marL="114300" indent="-342900" defTabSz="914400">
               <a:spcAft>
                 <a:spcPts val="600"/>
               </a:spcAft>
-              <a:buFont typeface="Arial" panose="020B0604020202020204" pitchFamily="34" charset="0"/>
-              <a:buChar char="•"/>
+              <a:buFont typeface="+mj-lt"/>
+              <a:buAutoNum type="arabicPeriod"/>
             </a:pPr>
             <a:r>
-              <a:rPr lang="en-US" sz="1700"/>
+              <a:rPr lang="en-US" sz="1700" dirty="0" err="1"/>
               <a:t>PVpanel</a:t>
             </a:r>
-          </a:p>
-          <a:p>
-            <a:pPr marL="285750" indent="-228600" defTabSz="914400">
+            <a:endParaRPr lang="en-US" sz="1700" dirty="0"/>
+          </a:p>
+          <a:p>
+            <a:pPr marL="114300" indent="-342900" defTabSz="914400">
               <a:spcAft>
                 <a:spcPts val="600"/>
               </a:spcAft>
-              <a:buFont typeface="Arial" panose="020B0604020202020204" pitchFamily="34" charset="0"/>
-              <a:buChar char="•"/>
+              <a:buFont typeface="+mj-lt"/>
+              <a:buAutoNum type="arabicPeriod"/>
             </a:pPr>
             <a:r>
-              <a:rPr lang="en-US" sz="1700"/>
+              <a:rPr lang="en-US" sz="1700" dirty="0" err="1"/>
               <a:t>PVstring</a:t>
             </a:r>
-          </a:p>
-          <a:p>
-            <a:pPr marL="285750" indent="-228600" defTabSz="914400">
+            <a:endParaRPr lang="en-US" sz="1700" dirty="0"/>
+          </a:p>
+          <a:p>
+            <a:pPr marL="114300" indent="-342900" defTabSz="914400">
               <a:spcAft>
                 <a:spcPts val="600"/>
               </a:spcAft>
-              <a:buFont typeface="Arial" panose="020B0604020202020204" pitchFamily="34" charset="0"/>
-              <a:buChar char="•"/>
+              <a:buFont typeface="+mj-lt"/>
+              <a:buAutoNum type="arabicPeriod"/>
             </a:pPr>
             <a:r>
-              <a:rPr lang="en-US" sz="1700"/>
+              <a:rPr lang="en-US" sz="1700" dirty="0" err="1"/>
               <a:t>PVparallel</a:t>
             </a:r>
-          </a:p>
-          <a:p>
-            <a:pPr marL="285750" indent="-228600" defTabSz="914400">
+            <a:endParaRPr lang="en-US" sz="1700" dirty="0"/>
+          </a:p>
+          <a:p>
+            <a:pPr marL="114300" indent="-342900" defTabSz="914400">
               <a:spcAft>
                 <a:spcPts val="600"/>
               </a:spcAft>
-              <a:buFont typeface="Arial" panose="020B0604020202020204" pitchFamily="34" charset="0"/>
-              <a:buChar char="•"/>
+              <a:buFont typeface="+mj-lt"/>
+              <a:buAutoNum type="arabicPeriod"/>
             </a:pPr>
             <a:r>
-              <a:rPr lang="en-US" sz="1700"/>
+              <a:rPr lang="en-US" sz="1700" dirty="0" err="1"/>
               <a:t>PVsimulator</a:t>
             </a:r>
-          </a:p>
-          <a:p>
-            <a:pPr marL="285750" indent="-228600" defTabSz="914400">
+            <a:endParaRPr lang="en-US" sz="1700" dirty="0"/>
+          </a:p>
+          <a:p>
+            <a:pPr marL="114300" indent="-342900" defTabSz="914400">
               <a:spcAft>
                 <a:spcPts val="600"/>
               </a:spcAft>
-              <a:buFont typeface="Arial" panose="020B0604020202020204" pitchFamily="34" charset="0"/>
-              <a:buChar char="•"/>
+              <a:buFont typeface="+mj-lt"/>
+              <a:buAutoNum type="arabicPeriod"/>
             </a:pPr>
             <a:r>
-              <a:rPr lang="en-US" sz="1700"/>
+              <a:rPr lang="en-US" sz="1700" dirty="0" err="1"/>
               <a:t>PVutils</a:t>
             </a:r>
+            <a:endParaRPr lang="en-US" sz="1700" dirty="0"/>
           </a:p>
         </p:txBody>
       </p:sp>
@@ -13135,13 +13211,347 @@
   <p:clrMapOvr>
     <a:masterClrMapping/>
   </p:clrMapOvr>
-  <mc:AlternateContent xmlns:mc="http://schemas.openxmlformats.org/markup-compatibility/2006">
-    <mc:Choice xmlns:p159="http://schemas.microsoft.com/office/powerpoint/2015/09/main" Requires="p159">
+  <mc:AlternateContent xmlns:mc="http://schemas.openxmlformats.org/markup-compatibility/2006" xmlns:p159="http://schemas.microsoft.com/office/powerpoint/2015/09/main">
+    <mc:Choice Requires="p159">
       <p:transition xmlns:p14="http://schemas.microsoft.com/office/powerpoint/2010/main" spd="slow" p14:dur="2000">
         <p159:morph option="byObject"/>
       </p:transition>
     </mc:Choice>
-    <mc:Fallback>
+    <mc:Fallback xmlns="">
+      <p:transition spd="slow">
+        <p:fade/>
+      </p:transition>
+    </mc:Fallback>
+  </mc:AlternateContent>
+</p:sld>
+</file>
+
+<file path=ppt/slides/slide5.xml><?xml version="1.0" encoding="utf-8"?>
+<p:sld xmlns:a="http://schemas.openxmlformats.org/drawingml/2006/main" xmlns:r="http://schemas.openxmlformats.org/officeDocument/2006/relationships" xmlns:p="http://schemas.openxmlformats.org/presentationml/2006/main">
+  <p:cSld>
+    <p:spTree>
+      <p:nvGrpSpPr>
+        <p:cNvPr id="1" name=""/>
+        <p:cNvGrpSpPr/>
+        <p:nvPr/>
+      </p:nvGrpSpPr>
+      <p:grpSpPr>
+        <a:xfrm>
+          <a:off x="0" y="0"/>
+          <a:ext cx="0" cy="0"/>
+          <a:chOff x="0" y="0"/>
+          <a:chExt cx="0" cy="0"/>
+        </a:xfrm>
+      </p:grpSpPr>
+      <p:sp>
+        <p:nvSpPr>
+          <p:cNvPr id="2" name="Titolo 1">
+            <a:extLst>
+              <a:ext uri="{FF2B5EF4-FFF2-40B4-BE49-F238E27FC236}">
+                <a16:creationId xmlns:a16="http://schemas.microsoft.com/office/drawing/2014/main" id="{FA74FA27-809E-FA42-4923-899507F85FF8}"/>
+              </a:ext>
+            </a:extLst>
+          </p:cNvPr>
+          <p:cNvSpPr>
+            <a:spLocks noGrp="1"/>
+          </p:cNvSpPr>
+          <p:nvPr>
+            <p:ph type="title"/>
+          </p:nvPr>
+        </p:nvSpPr>
+        <p:spPr/>
+        <p:txBody>
+          <a:bodyPr/>
+          <a:lstStyle/>
+          <a:p>
+            <a:r>
+              <a:rPr lang="it-IT" dirty="0"/>
+              <a:t>PVpanel class </a:t>
+            </a:r>
+          </a:p>
+        </p:txBody>
+      </p:sp>
+      <p:sp>
+        <p:nvSpPr>
+          <p:cNvPr id="4" name="Rectangle: Rounded Corners 3">
+            <a:extLst>
+              <a:ext uri="{FF2B5EF4-FFF2-40B4-BE49-F238E27FC236}">
+                <a16:creationId xmlns:a16="http://schemas.microsoft.com/office/drawing/2014/main" id="{470E3FB4-6DBF-E92F-7325-94B946B3FBA0}"/>
+              </a:ext>
+            </a:extLst>
+          </p:cNvPr>
+          <p:cNvSpPr/>
+          <p:nvPr/>
+        </p:nvSpPr>
+        <p:spPr>
+          <a:xfrm>
+            <a:off x="590204" y="2635135"/>
+            <a:ext cx="4746567" cy="3607723"/>
+          </a:xfrm>
+          <a:prstGeom prst="roundRect">
+            <a:avLst/>
+          </a:prstGeom>
+        </p:spPr>
+        <p:style>
+          <a:lnRef idx="2">
+            <a:schemeClr val="accent1">
+              <a:shade val="50000"/>
+            </a:schemeClr>
+          </a:lnRef>
+          <a:fillRef idx="1">
+            <a:schemeClr val="accent1"/>
+          </a:fillRef>
+          <a:effectRef idx="0">
+            <a:schemeClr val="accent1"/>
+          </a:effectRef>
+          <a:fontRef idx="minor">
+            <a:schemeClr val="lt1"/>
+          </a:fontRef>
+        </p:style>
+        <p:txBody>
+          <a:bodyPr rtlCol="0" anchor="ctr"/>
+          <a:lstStyle/>
+          <a:p>
+            <a:pPr algn="ctr"/>
+            <a:r>
+              <a:rPr lang="en-US" dirty="0"/>
+              <a:t>Starting from a set of parameters and a pair of operating conditions (G, T)</a:t>
+            </a:r>
+            <a:endParaRPr lang="it-IT" dirty="0"/>
+          </a:p>
+        </p:txBody>
+      </p:sp>
+      <p:sp>
+        <p:nvSpPr>
+          <p:cNvPr id="5" name="Rectangle: Rounded Corners 4">
+            <a:extLst>
+              <a:ext uri="{FF2B5EF4-FFF2-40B4-BE49-F238E27FC236}">
+                <a16:creationId xmlns:a16="http://schemas.microsoft.com/office/drawing/2014/main" id="{A0971179-FF88-47E0-8AEF-51EEAB8ABEF9}"/>
+              </a:ext>
+            </a:extLst>
+          </p:cNvPr>
+          <p:cNvSpPr/>
+          <p:nvPr/>
+        </p:nvSpPr>
+        <p:spPr>
+          <a:xfrm>
+            <a:off x="6855231" y="2635134"/>
+            <a:ext cx="4746567" cy="3607723"/>
+          </a:xfrm>
+          <a:prstGeom prst="roundRect">
+            <a:avLst/>
+          </a:prstGeom>
+        </p:spPr>
+        <p:style>
+          <a:lnRef idx="2">
+            <a:schemeClr val="accent1">
+              <a:shade val="50000"/>
+            </a:schemeClr>
+          </a:lnRef>
+          <a:fillRef idx="1">
+            <a:schemeClr val="accent1"/>
+          </a:fillRef>
+          <a:effectRef idx="0">
+            <a:schemeClr val="accent1"/>
+          </a:effectRef>
+          <a:fontRef idx="minor">
+            <a:schemeClr val="lt1"/>
+          </a:fontRef>
+        </p:style>
+        <p:txBody>
+          <a:bodyPr rtlCol="0" anchor="ctr"/>
+          <a:lstStyle/>
+          <a:p>
+            <a:pPr algn="ctr"/>
+            <a:r>
+              <a:rPr lang="en-US" dirty="0"/>
+              <a:t>The single I-V curve of the photovoltaic panel is produced by measuring the current at the terminals as the voltage varies.</a:t>
+            </a:r>
+            <a:endParaRPr lang="it-IT" dirty="0"/>
+          </a:p>
+        </p:txBody>
+      </p:sp>
+      <p:sp>
+        <p:nvSpPr>
+          <p:cNvPr id="6" name="Arrow: Right 5">
+            <a:extLst>
+              <a:ext uri="{FF2B5EF4-FFF2-40B4-BE49-F238E27FC236}">
+                <a16:creationId xmlns:a16="http://schemas.microsoft.com/office/drawing/2014/main" id="{76BC0DC3-BACC-8C30-DC41-1EB7C657A1D5}"/>
+              </a:ext>
+            </a:extLst>
+          </p:cNvPr>
+          <p:cNvSpPr/>
+          <p:nvPr/>
+        </p:nvSpPr>
+        <p:spPr>
+          <a:xfrm>
+            <a:off x="5519651" y="4181302"/>
+            <a:ext cx="1163782" cy="523702"/>
+          </a:xfrm>
+          <a:prstGeom prst="rightArrow">
+            <a:avLst/>
+          </a:prstGeom>
+        </p:spPr>
+        <p:style>
+          <a:lnRef idx="2">
+            <a:schemeClr val="dk1">
+              <a:shade val="50000"/>
+            </a:schemeClr>
+          </a:lnRef>
+          <a:fillRef idx="1">
+            <a:schemeClr val="dk1"/>
+          </a:fillRef>
+          <a:effectRef idx="0">
+            <a:schemeClr val="dk1"/>
+          </a:effectRef>
+          <a:fontRef idx="minor">
+            <a:schemeClr val="lt1"/>
+          </a:fontRef>
+        </p:style>
+        <p:txBody>
+          <a:bodyPr rtlCol="0" anchor="ctr"/>
+          <a:lstStyle/>
+          <a:p>
+            <a:pPr algn="ctr"/>
+            <a:endParaRPr lang="it-IT"/>
+          </a:p>
+        </p:txBody>
+      </p:sp>
+      <p:sp>
+        <p:nvSpPr>
+          <p:cNvPr id="7" name="TextBox 6">
+            <a:extLst>
+              <a:ext uri="{FF2B5EF4-FFF2-40B4-BE49-F238E27FC236}">
+                <a16:creationId xmlns:a16="http://schemas.microsoft.com/office/drawing/2014/main" id="{8E6E1DA5-5CE3-03FF-3160-3A5D05A72CC0}"/>
+              </a:ext>
+            </a:extLst>
+          </p:cNvPr>
+          <p:cNvSpPr txBox="1"/>
+          <p:nvPr/>
+        </p:nvSpPr>
+        <p:spPr>
+          <a:xfrm>
+            <a:off x="1022465" y="2851265"/>
+            <a:ext cx="3948546" cy="382386"/>
+          </a:xfrm>
+          <a:prstGeom prst="rect">
+            <a:avLst/>
+          </a:prstGeom>
+          <a:noFill/>
+        </p:spPr>
+        <p:txBody>
+          <a:bodyPr wrap="square" rtlCol="0">
+            <a:spAutoFit/>
+          </a:bodyPr>
+          <a:lstStyle/>
+          <a:p>
+            <a:pPr algn="ctr"/>
+            <a:r>
+              <a:rPr lang="it-IT" dirty="0"/>
+              <a:t>Input</a:t>
+            </a:r>
+          </a:p>
+        </p:txBody>
+      </p:sp>
+      <p:sp>
+        <p:nvSpPr>
+          <p:cNvPr id="8" name="TextBox 7">
+            <a:extLst>
+              <a:ext uri="{FF2B5EF4-FFF2-40B4-BE49-F238E27FC236}">
+                <a16:creationId xmlns:a16="http://schemas.microsoft.com/office/drawing/2014/main" id="{CAB92DAC-49BC-7D89-07C2-1A5300CFB77A}"/>
+              </a:ext>
+            </a:extLst>
+          </p:cNvPr>
+          <p:cNvSpPr txBox="1"/>
+          <p:nvPr/>
+        </p:nvSpPr>
+        <p:spPr>
+          <a:xfrm>
+            <a:off x="7254241" y="2851265"/>
+            <a:ext cx="3948546" cy="382386"/>
+          </a:xfrm>
+          <a:prstGeom prst="rect">
+            <a:avLst/>
+          </a:prstGeom>
+          <a:noFill/>
+        </p:spPr>
+        <p:txBody>
+          <a:bodyPr wrap="square" rtlCol="0">
+            <a:spAutoFit/>
+          </a:bodyPr>
+          <a:lstStyle/>
+          <a:p>
+            <a:pPr algn="ctr"/>
+            <a:r>
+              <a:rPr lang="it-IT" dirty="0"/>
+              <a:t>Output</a:t>
+            </a:r>
+          </a:p>
+        </p:txBody>
+      </p:sp>
+      <p:sp>
+        <p:nvSpPr>
+          <p:cNvPr id="9" name="Arrow: Right 8">
+            <a:extLst>
+              <a:ext uri="{FF2B5EF4-FFF2-40B4-BE49-F238E27FC236}">
+                <a16:creationId xmlns:a16="http://schemas.microsoft.com/office/drawing/2014/main" id="{EA83193D-3760-CB61-4350-B9A4506B4874}"/>
+              </a:ext>
+            </a:extLst>
+          </p:cNvPr>
+          <p:cNvSpPr/>
+          <p:nvPr/>
+        </p:nvSpPr>
+        <p:spPr>
+          <a:xfrm>
+            <a:off x="11773596" y="4177144"/>
+            <a:ext cx="1163782" cy="523702"/>
+          </a:xfrm>
+          <a:prstGeom prst="rightArrow">
+            <a:avLst/>
+          </a:prstGeom>
+        </p:spPr>
+        <p:style>
+          <a:lnRef idx="2">
+            <a:schemeClr val="dk1">
+              <a:shade val="50000"/>
+            </a:schemeClr>
+          </a:lnRef>
+          <a:fillRef idx="1">
+            <a:schemeClr val="dk1"/>
+          </a:fillRef>
+          <a:effectRef idx="0">
+            <a:schemeClr val="dk1"/>
+          </a:effectRef>
+          <a:fontRef idx="minor">
+            <a:schemeClr val="lt1"/>
+          </a:fontRef>
+        </p:style>
+        <p:txBody>
+          <a:bodyPr rtlCol="0" anchor="ctr"/>
+          <a:lstStyle/>
+          <a:p>
+            <a:pPr algn="ctr"/>
+            <a:endParaRPr lang="it-IT"/>
+          </a:p>
+        </p:txBody>
+      </p:sp>
+    </p:spTree>
+    <p:extLst>
+      <p:ext uri="{BB962C8B-B14F-4D97-AF65-F5344CB8AC3E}">
+        <p14:creationId xmlns:p14="http://schemas.microsoft.com/office/powerpoint/2010/main" val="2960758482"/>
+      </p:ext>
+    </p:extLst>
+  </p:cSld>
+  <p:clrMapOvr>
+    <a:masterClrMapping/>
+  </p:clrMapOvr>
+  <mc:AlternateContent xmlns:mc="http://schemas.openxmlformats.org/markup-compatibility/2006" xmlns:p159="http://schemas.microsoft.com/office/powerpoint/2015/09/main">
+    <mc:Choice Requires="p159">
+      <p:transition xmlns:p14="http://schemas.microsoft.com/office/powerpoint/2010/main" spd="slow" p14:dur="2000">
+        <p159:morph option="byObject"/>
+      </p:transition>
+    </mc:Choice>
+    <mc:Fallback xmlns="">
       <p:transition spd="slow">
         <p:fade/>
       </p:transition>
@@ -13190,17 +13600,17 @@
           <a:p>
             <a:r>
               <a:rPr lang="it-IT" dirty="0"/>
-              <a:t>PVpanel class </a:t>
+              <a:t>PVstring class </a:t>
             </a:r>
           </a:p>
         </p:txBody>
       </p:sp>
       <p:sp>
         <p:nvSpPr>
-          <p:cNvPr id="4" name="Rectangle: Rounded Corners 3">
-            <a:extLst>
-              <a:ext uri="{FF2B5EF4-FFF2-40B4-BE49-F238E27FC236}">
-                <a16:creationId xmlns:a16="http://schemas.microsoft.com/office/drawing/2014/main" id="{470E3FB4-6DBF-E92F-7325-94B946B3FBA0}"/>
+          <p:cNvPr id="3" name="Rectangle: Rounded Corners 2">
+            <a:extLst>
+              <a:ext uri="{FF2B5EF4-FFF2-40B4-BE49-F238E27FC236}">
+                <a16:creationId xmlns:a16="http://schemas.microsoft.com/office/drawing/2014/main" id="{BF700621-A990-8AC6-2BC8-D90673B251D4}"/>
               </a:ext>
             </a:extLst>
           </p:cNvPr>
@@ -13237,16 +13647,28 @@
           <a:lstStyle/>
           <a:p>
             <a:pPr algn="ctr"/>
+            <a:r>
+              <a:rPr lang="en-US" dirty="0"/>
+              <a:t>The </a:t>
+            </a:r>
+            <a:r>
+              <a:rPr lang="en-US" dirty="0" err="1"/>
+              <a:t>PVpanel</a:t>
+            </a:r>
+            <a:r>
+              <a:rPr lang="en-US" dirty="0"/>
+              <a:t> class is utilized to construct a new class for defining a series string of photovoltaic panels. In particular, thanks to the ability to create a list of objects.</a:t>
+            </a:r>
             <a:endParaRPr lang="it-IT" dirty="0"/>
           </a:p>
         </p:txBody>
       </p:sp>
       <p:sp>
         <p:nvSpPr>
-          <p:cNvPr id="5" name="Rectangle: Rounded Corners 4">
-            <a:extLst>
-              <a:ext uri="{FF2B5EF4-FFF2-40B4-BE49-F238E27FC236}">
-                <a16:creationId xmlns:a16="http://schemas.microsoft.com/office/drawing/2014/main" id="{A0971179-FF88-47E0-8AEF-51EEAB8ABEF9}"/>
+          <p:cNvPr id="4" name="Rectangle: Rounded Corners 3">
+            <a:extLst>
+              <a:ext uri="{FF2B5EF4-FFF2-40B4-BE49-F238E27FC236}">
+                <a16:creationId xmlns:a16="http://schemas.microsoft.com/office/drawing/2014/main" id="{4EAF32CC-533D-A882-35F5-6FAB7C436641}"/>
               </a:ext>
             </a:extLst>
           </p:cNvPr>
@@ -13283,16 +13705,28 @@
           <a:lstStyle/>
           <a:p>
             <a:pPr algn="ctr"/>
-            <a:endParaRPr lang="it-IT"/>
-          </a:p>
-        </p:txBody>
-      </p:sp>
-      <p:sp>
-        <p:nvSpPr>
-          <p:cNvPr id="6" name="Arrow: Right 5">
-            <a:extLst>
-              <a:ext uri="{FF2B5EF4-FFF2-40B4-BE49-F238E27FC236}">
-                <a16:creationId xmlns:a16="http://schemas.microsoft.com/office/drawing/2014/main" id="{76BC0DC3-BACC-8C30-DC41-1EB7C657A1D5}"/>
+            <a:r>
+              <a:rPr lang="en-US" dirty="0"/>
+              <a:t>An output is generated consisting of a list of </a:t>
+            </a:r>
+            <a:r>
+              <a:rPr lang="en-US" dirty="0" err="1"/>
+              <a:t>PVpanel</a:t>
+            </a:r>
+            <a:r>
+              <a:rPr lang="en-US" dirty="0"/>
+              <a:t> objects and a total I-V curve of all the panels in series.</a:t>
+            </a:r>
+            <a:endParaRPr lang="it-IT" dirty="0"/>
+          </a:p>
+        </p:txBody>
+      </p:sp>
+      <p:sp>
+        <p:nvSpPr>
+          <p:cNvPr id="5" name="Arrow: Right 4">
+            <a:extLst>
+              <a:ext uri="{FF2B5EF4-FFF2-40B4-BE49-F238E27FC236}">
+                <a16:creationId xmlns:a16="http://schemas.microsoft.com/office/drawing/2014/main" id="{791A712E-4433-7C58-F004-740B34BF2837}"/>
               </a:ext>
             </a:extLst>
           </p:cNvPr>
@@ -13335,10 +13769,10 @@
       </p:sp>
       <p:sp>
         <p:nvSpPr>
-          <p:cNvPr id="7" name="TextBox 6">
-            <a:extLst>
-              <a:ext uri="{FF2B5EF4-FFF2-40B4-BE49-F238E27FC236}">
-                <a16:creationId xmlns:a16="http://schemas.microsoft.com/office/drawing/2014/main" id="{8E6E1DA5-5CE3-03FF-3160-3A5D05A72CC0}"/>
+          <p:cNvPr id="6" name="TextBox 5">
+            <a:extLst>
+              <a:ext uri="{FF2B5EF4-FFF2-40B4-BE49-F238E27FC236}">
+                <a16:creationId xmlns:a16="http://schemas.microsoft.com/office/drawing/2014/main" id="{F8AA70FF-CE51-F536-A3EF-79267D35A6F2}"/>
               </a:ext>
             </a:extLst>
           </p:cNvPr>
@@ -13371,10 +13805,10 @@
       </p:sp>
       <p:sp>
         <p:nvSpPr>
-          <p:cNvPr id="8" name="TextBox 7">
-            <a:extLst>
-              <a:ext uri="{FF2B5EF4-FFF2-40B4-BE49-F238E27FC236}">
-                <a16:creationId xmlns:a16="http://schemas.microsoft.com/office/drawing/2014/main" id="{CAB92DAC-49BC-7D89-07C2-1A5300CFB77A}"/>
+          <p:cNvPr id="7" name="TextBox 6">
+            <a:extLst>
+              <a:ext uri="{FF2B5EF4-FFF2-40B4-BE49-F238E27FC236}">
+                <a16:creationId xmlns:a16="http://schemas.microsoft.com/office/drawing/2014/main" id="{3D183D7E-9E9F-27FD-233D-E85FE2508D7C}"/>
               </a:ext>
             </a:extLst>
           </p:cNvPr>
@@ -13407,10 +13841,10 @@
       </p:sp>
       <p:sp>
         <p:nvSpPr>
-          <p:cNvPr id="9" name="Arrow: Right 8">
-            <a:extLst>
-              <a:ext uri="{FF2B5EF4-FFF2-40B4-BE49-F238E27FC236}">
-                <a16:creationId xmlns:a16="http://schemas.microsoft.com/office/drawing/2014/main" id="{EA83193D-3760-CB61-4350-B9A4506B4874}"/>
+          <p:cNvPr id="8" name="Arrow: Right 7">
+            <a:extLst>
+              <a:ext uri="{FF2B5EF4-FFF2-40B4-BE49-F238E27FC236}">
+                <a16:creationId xmlns:a16="http://schemas.microsoft.com/office/drawing/2014/main" id="{B186C434-639E-AEE3-BC1E-E60567EC4DB3}"/>
               </a:ext>
             </a:extLst>
           </p:cNvPr>
@@ -13419,7 +13853,7 @@
         </p:nvSpPr>
         <p:spPr>
           <a:xfrm>
-            <a:off x="11773596" y="4177144"/>
+            <a:off x="-681643" y="4177144"/>
             <a:ext cx="1163782" cy="523702"/>
           </a:xfrm>
           <a:prstGeom prst="rightArrow">
@@ -13451,23 +13885,69 @@
           </a:p>
         </p:txBody>
       </p:sp>
+      <p:sp>
+        <p:nvSpPr>
+          <p:cNvPr id="9" name="Arrow: Right 8">
+            <a:extLst>
+              <a:ext uri="{FF2B5EF4-FFF2-40B4-BE49-F238E27FC236}">
+                <a16:creationId xmlns:a16="http://schemas.microsoft.com/office/drawing/2014/main" id="{C345D739-4D05-01E9-4C0B-187F9284FB49}"/>
+              </a:ext>
+            </a:extLst>
+          </p:cNvPr>
+          <p:cNvSpPr/>
+          <p:nvPr/>
+        </p:nvSpPr>
+        <p:spPr>
+          <a:xfrm>
+            <a:off x="11837943" y="4177144"/>
+            <a:ext cx="1163782" cy="523702"/>
+          </a:xfrm>
+          <a:prstGeom prst="rightArrow">
+            <a:avLst/>
+          </a:prstGeom>
+        </p:spPr>
+        <p:style>
+          <a:lnRef idx="2">
+            <a:schemeClr val="dk1">
+              <a:shade val="50000"/>
+            </a:schemeClr>
+          </a:lnRef>
+          <a:fillRef idx="1">
+            <a:schemeClr val="dk1"/>
+          </a:fillRef>
+          <a:effectRef idx="0">
+            <a:schemeClr val="dk1"/>
+          </a:effectRef>
+          <a:fontRef idx="minor">
+            <a:schemeClr val="lt1"/>
+          </a:fontRef>
+        </p:style>
+        <p:txBody>
+          <a:bodyPr rtlCol="0" anchor="ctr"/>
+          <a:lstStyle/>
+          <a:p>
+            <a:pPr algn="ctr"/>
+            <a:endParaRPr lang="it-IT"/>
+          </a:p>
+        </p:txBody>
+      </p:sp>
     </p:spTree>
     <p:extLst>
       <p:ext uri="{BB962C8B-B14F-4D97-AF65-F5344CB8AC3E}">
-        <p14:creationId xmlns:p14="http://schemas.microsoft.com/office/powerpoint/2010/main" val="2960758482"/>
+        <p14:creationId xmlns:p14="http://schemas.microsoft.com/office/powerpoint/2010/main" val="1313562501"/>
       </p:ext>
     </p:extLst>
   </p:cSld>
   <p:clrMapOvr>
     <a:masterClrMapping/>
   </p:clrMapOvr>
-  <mc:AlternateContent xmlns:mc="http://schemas.openxmlformats.org/markup-compatibility/2006">
-    <mc:Choice xmlns:p159="http://schemas.microsoft.com/office/powerpoint/2015/09/main" Requires="p159">
+  <mc:AlternateContent xmlns:mc="http://schemas.openxmlformats.org/markup-compatibility/2006" xmlns:p159="http://schemas.microsoft.com/office/powerpoint/2015/09/main">
+    <mc:Choice Requires="p159">
       <p:transition xmlns:p14="http://schemas.microsoft.com/office/powerpoint/2010/main" spd="slow" p14:dur="2000">
         <p159:morph option="byObject"/>
       </p:transition>
     </mc:Choice>
-    <mc:Fallback>
+    <mc:Fallback xmlns="">
       <p:transition spd="slow">
         <p:fade/>
       </p:transition>
@@ -13516,7 +13996,7 @@
           <a:p>
             <a:r>
               <a:rPr lang="it-IT" dirty="0"/>
-              <a:t>PVstring class </a:t>
+              <a:t>PVparallel class </a:t>
             </a:r>
           </a:p>
         </p:txBody>
@@ -13526,7 +14006,7 @@
           <p:cNvPr id="3" name="Rectangle: Rounded Corners 2">
             <a:extLst>
               <a:ext uri="{FF2B5EF4-FFF2-40B4-BE49-F238E27FC236}">
-                <a16:creationId xmlns:a16="http://schemas.microsoft.com/office/drawing/2014/main" id="{BF700621-A990-8AC6-2BC8-D90673B251D4}"/>
+                <a16:creationId xmlns:a16="http://schemas.microsoft.com/office/drawing/2014/main" id="{1AF7D942-5452-D7A0-0D19-7B14317B560A}"/>
               </a:ext>
             </a:extLst>
           </p:cNvPr>
@@ -13563,6 +14043,10 @@
           <a:lstStyle/>
           <a:p>
             <a:pPr algn="ctr"/>
+            <a:r>
+              <a:rPr lang="en-US" dirty="0"/>
+              <a:t>Having a class for strings available, we can connect these PV strings in parallel to increase the total power output.</a:t>
+            </a:r>
             <a:endParaRPr lang="it-IT" dirty="0"/>
           </a:p>
         </p:txBody>
@@ -13572,7 +14056,7 @@
           <p:cNvPr id="4" name="Rectangle: Rounded Corners 3">
             <a:extLst>
               <a:ext uri="{FF2B5EF4-FFF2-40B4-BE49-F238E27FC236}">
-                <a16:creationId xmlns:a16="http://schemas.microsoft.com/office/drawing/2014/main" id="{4EAF32CC-533D-A882-35F5-6FAB7C436641}"/>
+                <a16:creationId xmlns:a16="http://schemas.microsoft.com/office/drawing/2014/main" id="{945D369B-9D77-9E0B-296E-303294C357ED}"/>
               </a:ext>
             </a:extLst>
           </p:cNvPr>
@@ -13609,7 +14093,11 @@
           <a:lstStyle/>
           <a:p>
             <a:pPr algn="ctr"/>
-            <a:endParaRPr lang="it-IT"/>
+            <a:r>
+              <a:rPr lang="en-US" dirty="0"/>
+              <a:t>In particular, a method is constructed to optimize the selection of voltage in order to maximize the power output of the system.</a:t>
+            </a:r>
+            <a:endParaRPr lang="it-IT" dirty="0"/>
           </a:p>
         </p:txBody>
       </p:sp>
@@ -13618,7 +14106,7 @@
           <p:cNvPr id="5" name="Arrow: Right 4">
             <a:extLst>
               <a:ext uri="{FF2B5EF4-FFF2-40B4-BE49-F238E27FC236}">
-                <a16:creationId xmlns:a16="http://schemas.microsoft.com/office/drawing/2014/main" id="{791A712E-4433-7C58-F004-740B34BF2837}"/>
+                <a16:creationId xmlns:a16="http://schemas.microsoft.com/office/drawing/2014/main" id="{6CE49DBE-0701-FA76-A6FB-B1122E34543B}"/>
               </a:ext>
             </a:extLst>
           </p:cNvPr>
@@ -13664,7 +14152,7 @@
           <p:cNvPr id="6" name="TextBox 5">
             <a:extLst>
               <a:ext uri="{FF2B5EF4-FFF2-40B4-BE49-F238E27FC236}">
-                <a16:creationId xmlns:a16="http://schemas.microsoft.com/office/drawing/2014/main" id="{F8AA70FF-CE51-F536-A3EF-79267D35A6F2}"/>
+                <a16:creationId xmlns:a16="http://schemas.microsoft.com/office/drawing/2014/main" id="{25950A83-86FE-E474-5FCF-CBB2310B6F9E}"/>
               </a:ext>
             </a:extLst>
           </p:cNvPr>
@@ -13700,7 +14188,7 @@
           <p:cNvPr id="7" name="TextBox 6">
             <a:extLst>
               <a:ext uri="{FF2B5EF4-FFF2-40B4-BE49-F238E27FC236}">
-                <a16:creationId xmlns:a16="http://schemas.microsoft.com/office/drawing/2014/main" id="{3D183D7E-9E9F-27FD-233D-E85FE2508D7C}"/>
+                <a16:creationId xmlns:a16="http://schemas.microsoft.com/office/drawing/2014/main" id="{D6178F90-50B7-D14A-1E2A-9B36A6A1AB6D}"/>
               </a:ext>
             </a:extLst>
           </p:cNvPr>
@@ -13736,7 +14224,7 @@
           <p:cNvPr id="8" name="Arrow: Right 7">
             <a:extLst>
               <a:ext uri="{FF2B5EF4-FFF2-40B4-BE49-F238E27FC236}">
-                <a16:creationId xmlns:a16="http://schemas.microsoft.com/office/drawing/2014/main" id="{B186C434-639E-AEE3-BC1E-E60567EC4DB3}"/>
+                <a16:creationId xmlns:a16="http://schemas.microsoft.com/office/drawing/2014/main" id="{A043B4D9-ABD3-5DA8-18A3-6BF160BE89F8}"/>
               </a:ext>
             </a:extLst>
           </p:cNvPr>
@@ -13782,7 +14270,7 @@
           <p:cNvPr id="9" name="Arrow: Right 8">
             <a:extLst>
               <a:ext uri="{FF2B5EF4-FFF2-40B4-BE49-F238E27FC236}">
-                <a16:creationId xmlns:a16="http://schemas.microsoft.com/office/drawing/2014/main" id="{C345D739-4D05-01E9-4C0B-187F9284FB49}"/>
+                <a16:creationId xmlns:a16="http://schemas.microsoft.com/office/drawing/2014/main" id="{D568D34F-693B-45B8-6DCB-FE1BF25B186B}"/>
               </a:ext>
             </a:extLst>
           </p:cNvPr>
@@ -13826,20 +14314,20 @@
     </p:spTree>
     <p:extLst>
       <p:ext uri="{BB962C8B-B14F-4D97-AF65-F5344CB8AC3E}">
-        <p14:creationId xmlns:p14="http://schemas.microsoft.com/office/powerpoint/2010/main" val="1313562501"/>
+        <p14:creationId xmlns:p14="http://schemas.microsoft.com/office/powerpoint/2010/main" val="311193732"/>
       </p:ext>
     </p:extLst>
   </p:cSld>
   <p:clrMapOvr>
     <a:masterClrMapping/>
   </p:clrMapOvr>
-  <mc:AlternateContent xmlns:mc="http://schemas.openxmlformats.org/markup-compatibility/2006">
-    <mc:Choice xmlns:p159="http://schemas.microsoft.com/office/powerpoint/2015/09/main" Requires="p159">
+  <mc:AlternateContent xmlns:mc="http://schemas.openxmlformats.org/markup-compatibility/2006" xmlns:p159="http://schemas.microsoft.com/office/powerpoint/2015/09/main">
+    <mc:Choice Requires="p159">
       <p:transition xmlns:p14="http://schemas.microsoft.com/office/powerpoint/2010/main" spd="slow" p14:dur="2000">
         <p159:morph option="byObject"/>
       </p:transition>
     </mc:Choice>
-    <mc:Fallback>
+    <mc:Fallback xmlns="">
       <p:transition spd="slow">
         <p:fade/>
       </p:transition>
@@ -13935,6 +14423,46 @@
           <a:lstStyle/>
           <a:p>
             <a:pPr algn="ctr"/>
+            <a:r>
+              <a:rPr lang="en-US" dirty="0"/>
+              <a:t>There are problems in both the string and parallel configurations:</a:t>
+            </a:r>
+          </a:p>
+          <a:p>
+            <a:pPr marL="342900" indent="-342900" algn="ctr">
+              <a:buFont typeface="+mj-lt"/>
+              <a:buAutoNum type="arabicPeriod"/>
+            </a:pPr>
+            <a:r>
+              <a:rPr lang="en-US" dirty="0"/>
+              <a:t>In the </a:t>
+            </a:r>
+            <a:r>
+              <a:rPr lang="en-US" dirty="0" err="1"/>
+              <a:t>PVString</a:t>
+            </a:r>
+            <a:r>
+              <a:rPr lang="en-US" dirty="0"/>
+              <a:t> class, there is a need to interpolate the total curve as it is initially composed of a series of points.</a:t>
+            </a:r>
+          </a:p>
+          <a:p>
+            <a:pPr marL="342900" indent="-342900" algn="ctr">
+              <a:buFont typeface="+mj-lt"/>
+              <a:buAutoNum type="arabicPeriod"/>
+            </a:pPr>
+            <a:r>
+              <a:rPr lang="en-US" dirty="0"/>
+              <a:t>In the </a:t>
+            </a:r>
+            <a:r>
+              <a:rPr lang="en-US" dirty="0" err="1"/>
+              <a:t>PVparallel</a:t>
+            </a:r>
+            <a:r>
+              <a:rPr lang="en-US" dirty="0"/>
+              <a:t> class, on the other hand, it is necessary to extract data from precise reports in CSV format.</a:t>
+            </a:r>
             <a:endParaRPr lang="it-IT" dirty="0"/>
           </a:p>
         </p:txBody>
@@ -13981,7 +14509,11 @@
           <a:lstStyle/>
           <a:p>
             <a:pPr algn="ctr"/>
-            <a:endParaRPr lang="it-IT"/>
+            <a:r>
+              <a:rPr lang="en-US" dirty="0"/>
+              <a:t>The result is the development of two methods that address these two encountered problems.</a:t>
+            </a:r>
+            <a:endParaRPr lang="it-IT" dirty="0"/>
           </a:p>
         </p:txBody>
       </p:sp>
@@ -14205,6 +14737,18 @@
   <p:clrMapOvr>
     <a:masterClrMapping/>
   </p:clrMapOvr>
+  <mc:AlternateContent xmlns:mc="http://schemas.openxmlformats.org/markup-compatibility/2006" xmlns:p159="http://schemas.microsoft.com/office/powerpoint/2015/09/main">
+    <mc:Choice Requires="p159">
+      <p:transition xmlns:p14="http://schemas.microsoft.com/office/powerpoint/2010/main" spd="slow" p14:dur="2000">
+        <p159:morph option="byObject"/>
+      </p:transition>
+    </mc:Choice>
+    <mc:Fallback xmlns="">
+      <p:transition spd="slow">
+        <p:fade/>
+      </p:transition>
+    </mc:Fallback>
+  </mc:AlternateContent>
 </p:sld>
 </file>
 
@@ -14248,7 +14792,7 @@
           <a:p>
             <a:r>
               <a:rPr lang="it-IT" dirty="0"/>
-              <a:t>PVparallel class </a:t>
+              <a:t>PVsimulator class </a:t>
             </a:r>
           </a:p>
         </p:txBody>
@@ -14258,7 +14802,7 @@
           <p:cNvPr id="3" name="Rectangle: Rounded Corners 2">
             <a:extLst>
               <a:ext uri="{FF2B5EF4-FFF2-40B4-BE49-F238E27FC236}">
-                <a16:creationId xmlns:a16="http://schemas.microsoft.com/office/drawing/2014/main" id="{1AF7D942-5452-D7A0-0D19-7B14317B560A}"/>
+                <a16:creationId xmlns:a16="http://schemas.microsoft.com/office/drawing/2014/main" id="{54D67E87-275C-12E7-B95E-F8958F9EE690}"/>
               </a:ext>
             </a:extLst>
           </p:cNvPr>
@@ -14295,6 +14839,10 @@
           <a:lstStyle/>
           <a:p>
             <a:pPr algn="ctr"/>
+            <a:r>
+              <a:rPr lang="en-US" dirty="0"/>
+              <a:t>In conclusion, a General and Modular Simulation class is created to generate a series of data on the power generated by the photovoltaic system.</a:t>
+            </a:r>
             <a:endParaRPr lang="it-IT" dirty="0"/>
           </a:p>
         </p:txBody>
@@ -14304,7 +14852,7 @@
           <p:cNvPr id="4" name="Rectangle: Rounded Corners 3">
             <a:extLst>
               <a:ext uri="{FF2B5EF4-FFF2-40B4-BE49-F238E27FC236}">
-                <a16:creationId xmlns:a16="http://schemas.microsoft.com/office/drawing/2014/main" id="{945D369B-9D77-9E0B-296E-303294C357ED}"/>
+                <a16:creationId xmlns:a16="http://schemas.microsoft.com/office/drawing/2014/main" id="{199BE6D5-8E78-4DD9-CC2D-391E5BDEF584}"/>
               </a:ext>
             </a:extLst>
           </p:cNvPr>
@@ -14341,7 +14889,15 @@
           <a:lstStyle/>
           <a:p>
             <a:pPr algn="ctr"/>
-            <a:endParaRPr lang="it-IT"/>
+            <a:endParaRPr lang="en-US" dirty="0"/>
+          </a:p>
+          <a:p>
+            <a:pPr algn="ctr"/>
+            <a:r>
+              <a:rPr lang="en-US" dirty="0"/>
+              <a:t>In particular, the result will be plots generated by the various classes mentioned earlier and invoked during the simulation. </a:t>
+            </a:r>
+            <a:endParaRPr lang="it-IT" dirty="0"/>
           </a:p>
         </p:txBody>
       </p:sp>
@@ -14350,7 +14906,7 @@
           <p:cNvPr id="5" name="Arrow: Right 4">
             <a:extLst>
               <a:ext uri="{FF2B5EF4-FFF2-40B4-BE49-F238E27FC236}">
-                <a16:creationId xmlns:a16="http://schemas.microsoft.com/office/drawing/2014/main" id="{6CE49DBE-0701-FA76-A6FB-B1122E34543B}"/>
+                <a16:creationId xmlns:a16="http://schemas.microsoft.com/office/drawing/2014/main" id="{4B471671-866F-77EF-3CC3-D41AC284B594}"/>
               </a:ext>
             </a:extLst>
           </p:cNvPr>
@@ -14396,7 +14952,7 @@
           <p:cNvPr id="6" name="TextBox 5">
             <a:extLst>
               <a:ext uri="{FF2B5EF4-FFF2-40B4-BE49-F238E27FC236}">
-                <a16:creationId xmlns:a16="http://schemas.microsoft.com/office/drawing/2014/main" id="{25950A83-86FE-E474-5FCF-CBB2310B6F9E}"/>
+                <a16:creationId xmlns:a16="http://schemas.microsoft.com/office/drawing/2014/main" id="{DAC31680-9613-2C0F-3B17-82D3FAAD4627}"/>
               </a:ext>
             </a:extLst>
           </p:cNvPr>
@@ -14432,7 +14988,7 @@
           <p:cNvPr id="7" name="TextBox 6">
             <a:extLst>
               <a:ext uri="{FF2B5EF4-FFF2-40B4-BE49-F238E27FC236}">
-                <a16:creationId xmlns:a16="http://schemas.microsoft.com/office/drawing/2014/main" id="{D6178F90-50B7-D14A-1E2A-9B36A6A1AB6D}"/>
+                <a16:creationId xmlns:a16="http://schemas.microsoft.com/office/drawing/2014/main" id="{845CD37C-B9D6-D0DA-1ACC-0BF09685DA0F}"/>
               </a:ext>
             </a:extLst>
           </p:cNvPr>
@@ -14468,7 +15024,7 @@
           <p:cNvPr id="8" name="Arrow: Right 7">
             <a:extLst>
               <a:ext uri="{FF2B5EF4-FFF2-40B4-BE49-F238E27FC236}">
-                <a16:creationId xmlns:a16="http://schemas.microsoft.com/office/drawing/2014/main" id="{A043B4D9-ABD3-5DA8-18A3-6BF160BE89F8}"/>
+                <a16:creationId xmlns:a16="http://schemas.microsoft.com/office/drawing/2014/main" id="{F5F79632-4F35-EF39-7927-2F5CD10BD189}"/>
               </a:ext>
             </a:extLst>
           </p:cNvPr>
@@ -14509,62 +15065,28 @@
           </a:p>
         </p:txBody>
       </p:sp>
-      <p:sp>
-        <p:nvSpPr>
-          <p:cNvPr id="9" name="Arrow: Right 8">
-            <a:extLst>
-              <a:ext uri="{FF2B5EF4-FFF2-40B4-BE49-F238E27FC236}">
-                <a16:creationId xmlns:a16="http://schemas.microsoft.com/office/drawing/2014/main" id="{D568D34F-693B-45B8-6DCB-FE1BF25B186B}"/>
-              </a:ext>
-            </a:extLst>
-          </p:cNvPr>
-          <p:cNvSpPr/>
-          <p:nvPr/>
-        </p:nvSpPr>
-        <p:spPr>
-          <a:xfrm>
-            <a:off x="11837943" y="4177144"/>
-            <a:ext cx="1163782" cy="523702"/>
-          </a:xfrm>
-          <a:prstGeom prst="rightArrow">
-            <a:avLst/>
-          </a:prstGeom>
-        </p:spPr>
-        <p:style>
-          <a:lnRef idx="2">
-            <a:schemeClr val="dk1">
-              <a:shade val="50000"/>
-            </a:schemeClr>
-          </a:lnRef>
-          <a:fillRef idx="1">
-            <a:schemeClr val="dk1"/>
-          </a:fillRef>
-          <a:effectRef idx="0">
-            <a:schemeClr val="dk1"/>
-          </a:effectRef>
-          <a:fontRef idx="minor">
-            <a:schemeClr val="lt1"/>
-          </a:fontRef>
-        </p:style>
-        <p:txBody>
-          <a:bodyPr rtlCol="0" anchor="ctr"/>
-          <a:lstStyle/>
-          <a:p>
-            <a:pPr algn="ctr"/>
-            <a:endParaRPr lang="it-IT"/>
-          </a:p>
-        </p:txBody>
-      </p:sp>
     </p:spTree>
     <p:extLst>
       <p:ext uri="{BB962C8B-B14F-4D97-AF65-F5344CB8AC3E}">
-        <p14:creationId xmlns:p14="http://schemas.microsoft.com/office/powerpoint/2010/main" val="311193732"/>
+        <p14:creationId xmlns:p14="http://schemas.microsoft.com/office/powerpoint/2010/main" val="3459628496"/>
       </p:ext>
     </p:extLst>
   </p:cSld>
   <p:clrMapOvr>
     <a:masterClrMapping/>
   </p:clrMapOvr>
+  <mc:AlternateContent xmlns:mc="http://schemas.openxmlformats.org/markup-compatibility/2006" xmlns:p159="http://schemas.microsoft.com/office/powerpoint/2015/09/main">
+    <mc:Choice Requires="p159">
+      <p:transition xmlns:p14="http://schemas.microsoft.com/office/powerpoint/2010/main" spd="slow" p14:dur="2000">
+        <p159:morph option="byObject"/>
+      </p:transition>
+    </mc:Choice>
+    <mc:Fallback xmlns="">
+      <p:transition spd="slow">
+        <p:fade/>
+      </p:transition>
+    </mc:Fallback>
+  </mc:AlternateContent>
 </p:sld>
 </file>
 

</xml_diff>